<commit_message>
Edit slide, bo sung xem chi tiet hoa don
</commit_message>
<xml_diff>
--- a/Documents/BaoCao/SlidePBL3.pptx
+++ b/Documents/BaoCao/SlidePBL3.pptx
@@ -20,23 +20,24 @@
     <p:sldId id="391" r:id="rId14"/>
     <p:sldId id="392" r:id="rId15"/>
     <p:sldId id="393" r:id="rId16"/>
-    <p:sldId id="373" r:id="rId17"/>
-    <p:sldId id="394" r:id="rId18"/>
-    <p:sldId id="395" r:id="rId19"/>
-    <p:sldId id="396" r:id="rId20"/>
-    <p:sldId id="397" r:id="rId21"/>
-    <p:sldId id="398" r:id="rId22"/>
-    <p:sldId id="374" r:id="rId23"/>
-    <p:sldId id="375" r:id="rId24"/>
-    <p:sldId id="399" r:id="rId25"/>
-    <p:sldId id="376" r:id="rId26"/>
-    <p:sldId id="377" r:id="rId27"/>
-    <p:sldId id="384" r:id="rId28"/>
-    <p:sldId id="389" r:id="rId29"/>
-    <p:sldId id="386" r:id="rId30"/>
-    <p:sldId id="388" r:id="rId31"/>
-    <p:sldId id="385" r:id="rId32"/>
-    <p:sldId id="364" r:id="rId33"/>
+    <p:sldId id="400" r:id="rId17"/>
+    <p:sldId id="373" r:id="rId18"/>
+    <p:sldId id="394" r:id="rId19"/>
+    <p:sldId id="395" r:id="rId20"/>
+    <p:sldId id="396" r:id="rId21"/>
+    <p:sldId id="397" r:id="rId22"/>
+    <p:sldId id="398" r:id="rId23"/>
+    <p:sldId id="374" r:id="rId24"/>
+    <p:sldId id="375" r:id="rId25"/>
+    <p:sldId id="399" r:id="rId26"/>
+    <p:sldId id="376" r:id="rId27"/>
+    <p:sldId id="377" r:id="rId28"/>
+    <p:sldId id="384" r:id="rId29"/>
+    <p:sldId id="389" r:id="rId30"/>
+    <p:sldId id="386" r:id="rId31"/>
+    <p:sldId id="388" r:id="rId32"/>
+    <p:sldId id="385" r:id="rId33"/>
+    <p:sldId id="364" r:id="rId34"/>
   </p:sldIdLst>
   <p:sldSz cx="12192000" cy="6858000"/>
   <p:notesSz cx="6858000" cy="9144000"/>
@@ -15112,13 +15113,13 @@
   <p:clrMapOvr>
     <a:masterClrMapping/>
   </p:clrMapOvr>
-  <mc:AlternateContent xmlns:mc="http://schemas.openxmlformats.org/markup-compatibility/2006">
-    <mc:Choice xmlns:p14="http://schemas.microsoft.com/office/powerpoint/2010/main" Requires="p14">
+  <mc:AlternateContent xmlns:mc="http://schemas.openxmlformats.org/markup-compatibility/2006" xmlns:p14="http://schemas.microsoft.com/office/powerpoint/2010/main">
+    <mc:Choice Requires="p14">
       <p:transition spd="med" p14:dur="700">
         <p:fade/>
       </p:transition>
     </mc:Choice>
-    <mc:Fallback>
+    <mc:Fallback xmlns="">
       <p:transition spd="med">
         <p:fade/>
       </p:transition>
@@ -15475,13 +15476,13 @@
   <p:clrMapOvr>
     <a:masterClrMapping/>
   </p:clrMapOvr>
-  <mc:AlternateContent xmlns:mc="http://schemas.openxmlformats.org/markup-compatibility/2006">
-    <mc:Choice xmlns:p14="http://schemas.microsoft.com/office/powerpoint/2010/main" Requires="p14">
+  <mc:AlternateContent xmlns:mc="http://schemas.openxmlformats.org/markup-compatibility/2006" xmlns:p14="http://schemas.microsoft.com/office/powerpoint/2010/main">
+    <mc:Choice Requires="p14">
       <p:transition spd="med" p14:dur="700">
         <p:fade/>
       </p:transition>
     </mc:Choice>
-    <mc:Fallback>
+    <mc:Fallback xmlns="">
       <p:transition spd="med">
         <p:fade/>
       </p:transition>
@@ -15838,13 +15839,13 @@
   <p:clrMapOvr>
     <a:masterClrMapping/>
   </p:clrMapOvr>
-  <mc:AlternateContent xmlns:mc="http://schemas.openxmlformats.org/markup-compatibility/2006">
-    <mc:Choice xmlns:p14="http://schemas.microsoft.com/office/powerpoint/2010/main" Requires="p14">
+  <mc:AlternateContent xmlns:mc="http://schemas.openxmlformats.org/markup-compatibility/2006" xmlns:p14="http://schemas.microsoft.com/office/powerpoint/2010/main">
+    <mc:Choice Requires="p14">
       <p:transition spd="med" p14:dur="700">
         <p:fade/>
       </p:transition>
     </mc:Choice>
-    <mc:Fallback>
+    <mc:Fallback xmlns="">
       <p:transition spd="med">
         <p:fade/>
       </p:transition>
@@ -16201,13 +16202,13 @@
   <p:clrMapOvr>
     <a:masterClrMapping/>
   </p:clrMapOvr>
-  <mc:AlternateContent xmlns:mc="http://schemas.openxmlformats.org/markup-compatibility/2006">
-    <mc:Choice xmlns:p14="http://schemas.microsoft.com/office/powerpoint/2010/main" Requires="p14">
+  <mc:AlternateContent xmlns:mc="http://schemas.openxmlformats.org/markup-compatibility/2006" xmlns:p14="http://schemas.microsoft.com/office/powerpoint/2010/main">
+    <mc:Choice Requires="p14">
       <p:transition spd="med" p14:dur="700">
         <p:fade/>
       </p:transition>
     </mc:Choice>
-    <mc:Fallback>
+    <mc:Fallback xmlns="">
       <p:transition spd="med">
         <p:fade/>
       </p:transition>
@@ -16506,7 +16507,7 @@
                 </a:effectLst>
                 <a:latin typeface="Nexa Bold" panose="02000000000000000000" pitchFamily="50" charset="0"/>
               </a:rPr>
-              <a:t>quản</a:t>
+              <a:t>xem</a:t>
             </a:r>
             <a:r>
               <a:rPr lang="en-US" sz="3500" dirty="0">
@@ -16522,7 +16523,7 @@
                 </a:effectLst>
                 <a:latin typeface="Nexa Bold" panose="02000000000000000000" pitchFamily="50" charset="0"/>
               </a:rPr>
-              <a:t> </a:t>
+              <a:t> chi </a:t>
             </a:r>
             <a:r>
               <a:rPr lang="en-US" sz="3500" dirty="0" err="1">
@@ -16538,7 +16539,7 @@
                 </a:effectLst>
                 <a:latin typeface="Nexa Bold" panose="02000000000000000000" pitchFamily="50" charset="0"/>
               </a:rPr>
-              <a:t>lý</a:t>
+              <a:t>tiết</a:t>
             </a:r>
             <a:r>
               <a:rPr lang="en-US" sz="3500" dirty="0">
@@ -16570,7 +16571,39 @@
                 </a:effectLst>
                 <a:latin typeface="Nexa Bold" panose="02000000000000000000" pitchFamily="50" charset="0"/>
               </a:rPr>
-              <a:t>chính</a:t>
+              <a:t>hoá</a:t>
+            </a:r>
+            <a:r>
+              <a:rPr lang="en-US" sz="3500" dirty="0">
+                <a:solidFill>
+                  <a:schemeClr val="bg1"/>
+                </a:solidFill>
+                <a:effectLst>
+                  <a:outerShdw blurRad="1270000" dist="914400" dir="8100000" algn="tr" rotWithShape="0">
+                    <a:prstClr val="black">
+                      <a:alpha val="40000"/>
+                    </a:prstClr>
+                  </a:outerShdw>
+                </a:effectLst>
+                <a:latin typeface="Nexa Bold" panose="02000000000000000000" pitchFamily="50" charset="0"/>
+              </a:rPr>
+              <a:t> </a:t>
+            </a:r>
+            <a:r>
+              <a:rPr lang="en-US" sz="3500" dirty="0" err="1">
+                <a:solidFill>
+                  <a:schemeClr val="bg1"/>
+                </a:solidFill>
+                <a:effectLst>
+                  <a:outerShdw blurRad="1270000" dist="914400" dir="8100000" algn="tr" rotWithShape="0">
+                    <a:prstClr val="black">
+                      <a:alpha val="40000"/>
+                    </a:prstClr>
+                  </a:outerShdw>
+                </a:effectLst>
+                <a:latin typeface="Nexa Bold" panose="02000000000000000000" pitchFamily="50" charset="0"/>
+              </a:rPr>
+              <a:t>đơn</a:t>
             </a:r>
             <a:endParaRPr lang="en-US" sz="3500" dirty="0">
               <a:solidFill>
@@ -16590,51 +16623,68 @@
       </p:sp>
       <p:pic>
         <p:nvPicPr>
-          <p:cNvPr id="4" name="Picture 3">
+          <p:cNvPr id="1026" name="Picture 2" descr="No description available.">
             <a:extLst>
               <a:ext uri="{FF2B5EF4-FFF2-40B4-BE49-F238E27FC236}">
-                <a16:creationId xmlns:a16="http://schemas.microsoft.com/office/drawing/2014/main" id="{4B0E87F0-A6D9-44B6-9493-C879B543F70C}"/>
+                <a16:creationId xmlns:a16="http://schemas.microsoft.com/office/drawing/2014/main" id="{A350B136-8512-45E9-B405-EBAB16114650}"/>
               </a:ext>
             </a:extLst>
           </p:cNvPr>
           <p:cNvPicPr>
-            <a:picLocks noChangeAspect="1"/>
+            <a:picLocks noChangeAspect="1" noChangeArrowheads="1"/>
           </p:cNvPicPr>
           <p:nvPr/>
         </p:nvPicPr>
         <p:blipFill>
-          <a:blip r:embed="rId2"/>
+          <a:blip r:embed="rId2">
+            <a:extLst>
+              <a:ext uri="{28A0092B-C50C-407E-A947-70E740481C1C}">
+                <a14:useLocalDpi xmlns:a14="http://schemas.microsoft.com/office/drawing/2010/main" val="0"/>
+              </a:ext>
+            </a:extLst>
+          </a:blip>
+          <a:srcRect/>
           <a:stretch>
             <a:fillRect/>
           </a:stretch>
         </p:blipFill>
-        <p:spPr>
+        <p:spPr bwMode="auto">
           <a:xfrm>
-            <a:off x="1333423" y="1372176"/>
-            <a:ext cx="9364382" cy="4782217"/>
+            <a:off x="2999607" y="990600"/>
+            <a:ext cx="6192785" cy="5795674"/>
           </a:xfrm>
           <a:prstGeom prst="rect">
             <a:avLst/>
           </a:prstGeom>
+          <a:noFill/>
+          <a:extLst>
+            <a:ext uri="{909E8E84-426E-40DD-AFC4-6F175D3DCCD1}">
+              <a14:hiddenFill xmlns:a14="http://schemas.microsoft.com/office/drawing/2010/main">
+                <a:solidFill>
+                  <a:srgbClr val="FFFFFF"/>
+                </a:solidFill>
+              </a14:hiddenFill>
+            </a:ext>
+          </a:extLst>
         </p:spPr>
       </p:pic>
     </p:spTree>
     <p:extLst>
       <p:ext uri="{BB962C8B-B14F-4D97-AF65-F5344CB8AC3E}">
-        <p14:creationId xmlns:p14="http://schemas.microsoft.com/office/powerpoint/2010/main" val="2381194677"/>
+        <p14:creationId xmlns:p14="http://schemas.microsoft.com/office/powerpoint/2010/main" val="4070079399"/>
       </p:ext>
     </p:extLst>
   </p:cSld>
   <p:clrMapOvr>
     <a:masterClrMapping/>
   </p:clrMapOvr>
-  <mc:AlternateContent xmlns:mc="http://schemas.openxmlformats.org/markup-compatibility/2006" xmlns:p14="http://schemas.microsoft.com/office/powerpoint/2010/main">
-    <mc:Choice Requires="p14">
+  <mc:AlternateContent xmlns:mc="http://schemas.openxmlformats.org/markup-compatibility/2006">
+    <mc:Choice xmlns:p14="http://schemas.microsoft.com/office/powerpoint/2010/main" Requires="p14">
       <p:transition spd="med" p14:dur="700">
         <p:fade/>
       </p:transition>
     </mc:Choice>
-    <mc:Fallback xmlns="">
+    <mc:Fallback>
       <p:transition spd="med">
         <p:fade/>
       </p:transition>
@@ -17017,10 +17067,10 @@
       </p:sp>
       <p:pic>
         <p:nvPicPr>
-          <p:cNvPr id="3" name="Picture 2">
+          <p:cNvPr id="4" name="Picture 3">
             <a:extLst>
               <a:ext uri="{FF2B5EF4-FFF2-40B4-BE49-F238E27FC236}">
-                <a16:creationId xmlns:a16="http://schemas.microsoft.com/office/drawing/2014/main" id="{12BA9D49-92EF-4D7C-84C5-A0D324F4D7C1}"/>
+                <a16:creationId xmlns:a16="http://schemas.microsoft.com/office/drawing/2014/main" id="{4B0E87F0-A6D9-44B6-9493-C879B543F70C}"/>
               </a:ext>
             </a:extLst>
           </p:cNvPr>
@@ -17037,8 +17087,8 @@
         </p:blipFill>
         <p:spPr>
           <a:xfrm>
-            <a:off x="1423335" y="1432212"/>
-            <a:ext cx="9345329" cy="4725059"/>
+            <a:off x="1333423" y="1372176"/>
+            <a:ext cx="9364382" cy="4782217"/>
           </a:xfrm>
           <a:prstGeom prst="rect">
             <a:avLst/>
@@ -17048,20 +17098,20 @@
     </p:spTree>
     <p:extLst>
       <p:ext uri="{BB962C8B-B14F-4D97-AF65-F5344CB8AC3E}">
-        <p14:creationId xmlns:p14="http://schemas.microsoft.com/office/powerpoint/2010/main" val="3508537806"/>
+        <p14:creationId xmlns:p14="http://schemas.microsoft.com/office/powerpoint/2010/main" val="2381194677"/>
       </p:ext>
     </p:extLst>
   </p:cSld>
   <p:clrMapOvr>
     <a:masterClrMapping/>
   </p:clrMapOvr>
-  <mc:AlternateContent xmlns:mc="http://schemas.openxmlformats.org/markup-compatibility/2006">
-    <mc:Choice xmlns:p14="http://schemas.microsoft.com/office/powerpoint/2010/main" Requires="p14">
+  <mc:AlternateContent xmlns:mc="http://schemas.openxmlformats.org/markup-compatibility/2006" xmlns:p14="http://schemas.microsoft.com/office/powerpoint/2010/main">
+    <mc:Choice Requires="p14">
       <p:transition spd="med" p14:dur="700">
         <p:fade/>
       </p:transition>
     </mc:Choice>
-    <mc:Fallback>
+    <mc:Fallback xmlns="">
       <p:transition spd="med">
         <p:fade/>
       </p:transition>
@@ -17444,10 +17494,10 @@
       </p:sp>
       <p:pic>
         <p:nvPicPr>
-          <p:cNvPr id="4" name="Picture 3">
+          <p:cNvPr id="3" name="Picture 2">
             <a:extLst>
               <a:ext uri="{FF2B5EF4-FFF2-40B4-BE49-F238E27FC236}">
-                <a16:creationId xmlns:a16="http://schemas.microsoft.com/office/drawing/2014/main" id="{9ABAEA4A-16E7-48B7-A315-2BAD5408553D}"/>
+                <a16:creationId xmlns:a16="http://schemas.microsoft.com/office/drawing/2014/main" id="{12BA9D49-92EF-4D7C-84C5-A0D324F4D7C1}"/>
               </a:ext>
             </a:extLst>
           </p:cNvPr>
@@ -17464,8 +17514,8 @@
         </p:blipFill>
         <p:spPr>
           <a:xfrm>
-            <a:off x="1413809" y="1311363"/>
-            <a:ext cx="9364382" cy="4772691"/>
+            <a:off x="1423335" y="1432212"/>
+            <a:ext cx="9345329" cy="4725059"/>
           </a:xfrm>
           <a:prstGeom prst="rect">
             <a:avLst/>
@@ -17475,20 +17525,20 @@
     </p:spTree>
     <p:extLst>
       <p:ext uri="{BB962C8B-B14F-4D97-AF65-F5344CB8AC3E}">
-        <p14:creationId xmlns:p14="http://schemas.microsoft.com/office/powerpoint/2010/main" val="2362621876"/>
+        <p14:creationId xmlns:p14="http://schemas.microsoft.com/office/powerpoint/2010/main" val="3508537806"/>
       </p:ext>
     </p:extLst>
   </p:cSld>
   <p:clrMapOvr>
     <a:masterClrMapping/>
   </p:clrMapOvr>
-  <mc:AlternateContent xmlns:mc="http://schemas.openxmlformats.org/markup-compatibility/2006">
-    <mc:Choice xmlns:p14="http://schemas.microsoft.com/office/powerpoint/2010/main" Requires="p14">
+  <mc:AlternateContent xmlns:mc="http://schemas.openxmlformats.org/markup-compatibility/2006" xmlns:p14="http://schemas.microsoft.com/office/powerpoint/2010/main">
+    <mc:Choice Requires="p14">
       <p:transition spd="med" p14:dur="700">
         <p:fade/>
       </p:transition>
     </mc:Choice>
-    <mc:Fallback>
+    <mc:Fallback xmlns="">
       <p:transition spd="med">
         <p:fade/>
       </p:transition>
@@ -17871,10 +17921,10 @@
       </p:sp>
       <p:pic>
         <p:nvPicPr>
-          <p:cNvPr id="3" name="Picture 2">
+          <p:cNvPr id="4" name="Picture 3">
             <a:extLst>
               <a:ext uri="{FF2B5EF4-FFF2-40B4-BE49-F238E27FC236}">
-                <a16:creationId xmlns:a16="http://schemas.microsoft.com/office/drawing/2014/main" id="{7516FCEA-CD2A-465D-8AF4-9893AFDBB83F}"/>
+                <a16:creationId xmlns:a16="http://schemas.microsoft.com/office/drawing/2014/main" id="{9ABAEA4A-16E7-48B7-A315-2BAD5408553D}"/>
               </a:ext>
             </a:extLst>
           </p:cNvPr>
@@ -17891,8 +17941,8 @@
         </p:blipFill>
         <p:spPr>
           <a:xfrm>
-            <a:off x="1413809" y="1233051"/>
-            <a:ext cx="9364382" cy="4753638"/>
+            <a:off x="1413809" y="1311363"/>
+            <a:ext cx="9364382" cy="4772691"/>
           </a:xfrm>
           <a:prstGeom prst="rect">
             <a:avLst/>
@@ -17902,20 +17952,20 @@
     </p:spTree>
     <p:extLst>
       <p:ext uri="{BB962C8B-B14F-4D97-AF65-F5344CB8AC3E}">
-        <p14:creationId xmlns:p14="http://schemas.microsoft.com/office/powerpoint/2010/main" val="412825270"/>
+        <p14:creationId xmlns:p14="http://schemas.microsoft.com/office/powerpoint/2010/main" val="2362621876"/>
       </p:ext>
     </p:extLst>
   </p:cSld>
   <p:clrMapOvr>
     <a:masterClrMapping/>
   </p:clrMapOvr>
-  <mc:AlternateContent xmlns:mc="http://schemas.openxmlformats.org/markup-compatibility/2006">
-    <mc:Choice xmlns:p14="http://schemas.microsoft.com/office/powerpoint/2010/main" Requires="p14">
+  <mc:AlternateContent xmlns:mc="http://schemas.openxmlformats.org/markup-compatibility/2006" xmlns:p14="http://schemas.microsoft.com/office/powerpoint/2010/main">
+    <mc:Choice Requires="p14">
       <p:transition spd="med" p14:dur="700">
         <p:fade/>
       </p:transition>
     </mc:Choice>
-    <mc:Fallback>
+    <mc:Fallback xmlns="">
       <p:transition spd="med">
         <p:fade/>
       </p:transition>
@@ -20771,10 +20821,10 @@
       </p:sp>
       <p:pic>
         <p:nvPicPr>
-          <p:cNvPr id="4" name="Picture 3">
+          <p:cNvPr id="3" name="Picture 2">
             <a:extLst>
               <a:ext uri="{FF2B5EF4-FFF2-40B4-BE49-F238E27FC236}">
-                <a16:creationId xmlns:a16="http://schemas.microsoft.com/office/drawing/2014/main" id="{C1335EC2-41D6-431F-84DA-5B3D0C496EA4}"/>
+                <a16:creationId xmlns:a16="http://schemas.microsoft.com/office/drawing/2014/main" id="{7516FCEA-CD2A-465D-8AF4-9893AFDBB83F}"/>
               </a:ext>
             </a:extLst>
           </p:cNvPr>
@@ -20791,7 +20841,7 @@
         </p:blipFill>
         <p:spPr>
           <a:xfrm>
-            <a:off x="1413809" y="1202906"/>
+            <a:off x="1413809" y="1233051"/>
             <a:ext cx="9364382" cy="4753638"/>
           </a:xfrm>
           <a:prstGeom prst="rect">
@@ -20802,20 +20852,20 @@
     </p:spTree>
     <p:extLst>
       <p:ext uri="{BB962C8B-B14F-4D97-AF65-F5344CB8AC3E}">
-        <p14:creationId xmlns:p14="http://schemas.microsoft.com/office/powerpoint/2010/main" val="2846951573"/>
+        <p14:creationId xmlns:p14="http://schemas.microsoft.com/office/powerpoint/2010/main" val="412825270"/>
       </p:ext>
     </p:extLst>
   </p:cSld>
   <p:clrMapOvr>
     <a:masterClrMapping/>
   </p:clrMapOvr>
-  <mc:AlternateContent xmlns:mc="http://schemas.openxmlformats.org/markup-compatibility/2006">
-    <mc:Choice xmlns:p14="http://schemas.microsoft.com/office/powerpoint/2010/main" Requires="p14">
+  <mc:AlternateContent xmlns:mc="http://schemas.openxmlformats.org/markup-compatibility/2006" xmlns:p14="http://schemas.microsoft.com/office/powerpoint/2010/main">
+    <mc:Choice Requires="p14">
       <p:transition spd="med" p14:dur="700">
         <p:fade/>
       </p:transition>
     </mc:Choice>
-    <mc:Fallback>
+    <mc:Fallback xmlns="">
       <p:transition spd="med">
         <p:fade/>
       </p:transition>
@@ -21198,10 +21248,10 @@
       </p:sp>
       <p:pic>
         <p:nvPicPr>
-          <p:cNvPr id="3" name="Picture 2">
+          <p:cNvPr id="4" name="Picture 3">
             <a:extLst>
               <a:ext uri="{FF2B5EF4-FFF2-40B4-BE49-F238E27FC236}">
-                <a16:creationId xmlns:a16="http://schemas.microsoft.com/office/drawing/2014/main" id="{9955EA36-6807-485B-9CA5-D08A293E89A3}"/>
+                <a16:creationId xmlns:a16="http://schemas.microsoft.com/office/drawing/2014/main" id="{C1335EC2-41D6-431F-84DA-5B3D0C496EA4}"/>
               </a:ext>
             </a:extLst>
           </p:cNvPr>
@@ -21218,8 +21268,8 @@
         </p:blipFill>
         <p:spPr>
           <a:xfrm>
-            <a:off x="1418572" y="1308153"/>
-            <a:ext cx="9354856" cy="4744112"/>
+            <a:off x="1413809" y="1202906"/>
+            <a:ext cx="9364382" cy="4753638"/>
           </a:xfrm>
           <a:prstGeom prst="rect">
             <a:avLst/>
@@ -21229,20 +21279,20 @@
     </p:spTree>
     <p:extLst>
       <p:ext uri="{BB962C8B-B14F-4D97-AF65-F5344CB8AC3E}">
-        <p14:creationId xmlns:p14="http://schemas.microsoft.com/office/powerpoint/2010/main" val="1832306223"/>
+        <p14:creationId xmlns:p14="http://schemas.microsoft.com/office/powerpoint/2010/main" val="2846951573"/>
       </p:ext>
     </p:extLst>
   </p:cSld>
   <p:clrMapOvr>
     <a:masterClrMapping/>
   </p:clrMapOvr>
-  <mc:AlternateContent xmlns:mc="http://schemas.openxmlformats.org/markup-compatibility/2006">
-    <mc:Choice xmlns:p14="http://schemas.microsoft.com/office/powerpoint/2010/main" Requires="p14">
+  <mc:AlternateContent xmlns:mc="http://schemas.openxmlformats.org/markup-compatibility/2006" xmlns:p14="http://schemas.microsoft.com/office/powerpoint/2010/main">
+    <mc:Choice Requires="p14">
       <p:transition spd="med" p14:dur="700">
         <p:fade/>
       </p:transition>
     </mc:Choice>
-    <mc:Fallback>
+    <mc:Fallback xmlns="">
       <p:transition spd="med">
         <p:fade/>
       </p:transition>
@@ -21605,71 +21655,7 @@
                 </a:effectLst>
                 <a:latin typeface="Nexa Bold" panose="02000000000000000000" pitchFamily="50" charset="0"/>
               </a:rPr>
-              <a:t>đơn</a:t>
-            </a:r>
-            <a:r>
-              <a:rPr lang="en-US" sz="3500" dirty="0">
-                <a:solidFill>
-                  <a:schemeClr val="bg1"/>
-                </a:solidFill>
-                <a:effectLst>
-                  <a:outerShdw blurRad="1270000" dist="914400" dir="8100000" algn="tr" rotWithShape="0">
-                    <a:prstClr val="black">
-                      <a:alpha val="40000"/>
-                    </a:prstClr>
-                  </a:outerShdw>
-                </a:effectLst>
-                <a:latin typeface="Nexa Bold" panose="02000000000000000000" pitchFamily="50" charset="0"/>
-              </a:rPr>
-              <a:t> </a:t>
-            </a:r>
-            <a:r>
-              <a:rPr lang="en-US" sz="3500" dirty="0" err="1">
-                <a:solidFill>
-                  <a:schemeClr val="bg1"/>
-                </a:solidFill>
-                <a:effectLst>
-                  <a:outerShdw blurRad="1270000" dist="914400" dir="8100000" algn="tr" rotWithShape="0">
-                    <a:prstClr val="black">
-                      <a:alpha val="40000"/>
-                    </a:prstClr>
-                  </a:outerShdw>
-                </a:effectLst>
-                <a:latin typeface="Nexa Bold" panose="02000000000000000000" pitchFamily="50" charset="0"/>
-              </a:rPr>
-              <a:t>đặt</a:t>
-            </a:r>
-            <a:r>
-              <a:rPr lang="en-US" sz="3500" dirty="0">
-                <a:solidFill>
-                  <a:schemeClr val="bg1"/>
-                </a:solidFill>
-                <a:effectLst>
-                  <a:outerShdw blurRad="1270000" dist="914400" dir="8100000" algn="tr" rotWithShape="0">
-                    <a:prstClr val="black">
-                      <a:alpha val="40000"/>
-                    </a:prstClr>
-                  </a:outerShdw>
-                </a:effectLst>
-                <a:latin typeface="Nexa Bold" panose="02000000000000000000" pitchFamily="50" charset="0"/>
-              </a:rPr>
-              <a:t> </a:t>
-            </a:r>
-            <a:r>
-              <a:rPr lang="en-US" sz="3500" dirty="0" err="1">
-                <a:solidFill>
-                  <a:schemeClr val="bg1"/>
-                </a:solidFill>
-                <a:effectLst>
-                  <a:outerShdw blurRad="1270000" dist="914400" dir="8100000" algn="tr" rotWithShape="0">
-                    <a:prstClr val="black">
-                      <a:alpha val="40000"/>
-                    </a:prstClr>
-                  </a:outerShdw>
-                </a:effectLst>
-                <a:latin typeface="Nexa Bold" panose="02000000000000000000" pitchFamily="50" charset="0"/>
-              </a:rPr>
-              <a:t>phòng</a:t>
+              <a:t>chính</a:t>
             </a:r>
             <a:endParaRPr lang="en-US" sz="3500" dirty="0">
               <a:solidFill>
@@ -21689,10 +21675,10 @@
       </p:sp>
       <p:pic>
         <p:nvPicPr>
-          <p:cNvPr id="4" name="Picture 3">
+          <p:cNvPr id="3" name="Picture 2">
             <a:extLst>
               <a:ext uri="{FF2B5EF4-FFF2-40B4-BE49-F238E27FC236}">
-                <a16:creationId xmlns:a16="http://schemas.microsoft.com/office/drawing/2014/main" id="{CC573CFD-E03C-47A1-B45C-020FA23D0163}"/>
+                <a16:creationId xmlns:a16="http://schemas.microsoft.com/office/drawing/2014/main" id="{9955EA36-6807-485B-9CA5-D08A293E89A3}"/>
               </a:ext>
             </a:extLst>
           </p:cNvPr>
@@ -21709,8 +21695,8 @@
         </p:blipFill>
         <p:spPr>
           <a:xfrm>
-            <a:off x="1970340" y="1138742"/>
-            <a:ext cx="8251320" cy="5246763"/>
+            <a:off x="1418572" y="1308153"/>
+            <a:ext cx="9354856" cy="4744112"/>
           </a:xfrm>
           <a:prstGeom prst="rect">
             <a:avLst/>
@@ -21720,7 +21706,7 @@
     </p:spTree>
     <p:extLst>
       <p:ext uri="{BB962C8B-B14F-4D97-AF65-F5344CB8AC3E}">
-        <p14:creationId xmlns:p14="http://schemas.microsoft.com/office/powerpoint/2010/main" val="1087069275"/>
+        <p14:creationId xmlns:p14="http://schemas.microsoft.com/office/powerpoint/2010/main" val="1832306223"/>
       </p:ext>
     </p:extLst>
   </p:cSld>
@@ -22096,7 +22082,7 @@
                 </a:effectLst>
                 <a:latin typeface="Nexa Bold" panose="02000000000000000000" pitchFamily="50" charset="0"/>
               </a:rPr>
-              <a:t>nhân</a:t>
+              <a:t>đơn</a:t>
             </a:r>
             <a:r>
               <a:rPr lang="en-US" sz="3500" dirty="0">
@@ -22128,7 +22114,7 @@
                 </a:effectLst>
                 <a:latin typeface="Nexa Bold" panose="02000000000000000000" pitchFamily="50" charset="0"/>
               </a:rPr>
-              <a:t>viên</a:t>
+              <a:t>đặt</a:t>
             </a:r>
             <a:r>
               <a:rPr lang="en-US" sz="3500" dirty="0">
@@ -22160,71 +22146,7 @@
                 </a:effectLst>
                 <a:latin typeface="Nexa Bold" panose="02000000000000000000" pitchFamily="50" charset="0"/>
               </a:rPr>
-              <a:t>và</a:t>
-            </a:r>
-            <a:r>
-              <a:rPr lang="en-US" sz="3500" dirty="0">
-                <a:solidFill>
-                  <a:schemeClr val="bg1"/>
-                </a:solidFill>
-                <a:effectLst>
-                  <a:outerShdw blurRad="1270000" dist="914400" dir="8100000" algn="tr" rotWithShape="0">
-                    <a:prstClr val="black">
-                      <a:alpha val="40000"/>
-                    </a:prstClr>
-                  </a:outerShdw>
-                </a:effectLst>
-                <a:latin typeface="Nexa Bold" panose="02000000000000000000" pitchFamily="50" charset="0"/>
-              </a:rPr>
-              <a:t> </a:t>
-            </a:r>
-            <a:r>
-              <a:rPr lang="en-US" sz="3500" dirty="0" err="1">
-                <a:solidFill>
-                  <a:schemeClr val="bg1"/>
-                </a:solidFill>
-                <a:effectLst>
-                  <a:outerShdw blurRad="1270000" dist="914400" dir="8100000" algn="tr" rotWithShape="0">
-                    <a:prstClr val="black">
-                      <a:alpha val="40000"/>
-                    </a:prstClr>
-                  </a:outerShdw>
-                </a:effectLst>
-                <a:latin typeface="Nexa Bold" panose="02000000000000000000" pitchFamily="50" charset="0"/>
-              </a:rPr>
-              <a:t>chức</a:t>
-            </a:r>
-            <a:r>
-              <a:rPr lang="en-US" sz="3500" dirty="0">
-                <a:solidFill>
-                  <a:schemeClr val="bg1"/>
-                </a:solidFill>
-                <a:effectLst>
-                  <a:outerShdw blurRad="1270000" dist="914400" dir="8100000" algn="tr" rotWithShape="0">
-                    <a:prstClr val="black">
-                      <a:alpha val="40000"/>
-                    </a:prstClr>
-                  </a:outerShdw>
-                </a:effectLst>
-                <a:latin typeface="Nexa Bold" panose="02000000000000000000" pitchFamily="50" charset="0"/>
-              </a:rPr>
-              <a:t> </a:t>
-            </a:r>
-            <a:r>
-              <a:rPr lang="en-US" sz="3500" dirty="0" err="1">
-                <a:solidFill>
-                  <a:schemeClr val="bg1"/>
-                </a:solidFill>
-                <a:effectLst>
-                  <a:outerShdw blurRad="1270000" dist="914400" dir="8100000" algn="tr" rotWithShape="0">
-                    <a:prstClr val="black">
-                      <a:alpha val="40000"/>
-                    </a:prstClr>
-                  </a:outerShdw>
-                </a:effectLst>
-                <a:latin typeface="Nexa Bold" panose="02000000000000000000" pitchFamily="50" charset="0"/>
-              </a:rPr>
-              <a:t>vụ</a:t>
+              <a:t>phòng</a:t>
             </a:r>
             <a:endParaRPr lang="en-US" sz="3500" dirty="0">
               <a:solidFill>
@@ -22247,7 +22169,7 @@
           <p:cNvPr id="4" name="Picture 3">
             <a:extLst>
               <a:ext uri="{FF2B5EF4-FFF2-40B4-BE49-F238E27FC236}">
-                <a16:creationId xmlns:a16="http://schemas.microsoft.com/office/drawing/2014/main" id="{6E285F43-4B9E-4544-959D-AC6B8E88D371}"/>
+                <a16:creationId xmlns:a16="http://schemas.microsoft.com/office/drawing/2014/main" id="{CC573CFD-E03C-47A1-B45C-020FA23D0163}"/>
               </a:ext>
             </a:extLst>
           </p:cNvPr>
@@ -22264,8 +22186,8 @@
         </p:blipFill>
         <p:spPr>
           <a:xfrm>
-            <a:off x="1375708" y="1130276"/>
-            <a:ext cx="9440583" cy="5255229"/>
+            <a:off x="1970340" y="1138742"/>
+            <a:ext cx="8251320" cy="5246763"/>
           </a:xfrm>
           <a:prstGeom prst="rect">
             <a:avLst/>
@@ -22275,7 +22197,7 @@
     </p:spTree>
     <p:extLst>
       <p:ext uri="{BB962C8B-B14F-4D97-AF65-F5344CB8AC3E}">
-        <p14:creationId xmlns:p14="http://schemas.microsoft.com/office/powerpoint/2010/main" val="3543594690"/>
+        <p14:creationId xmlns:p14="http://schemas.microsoft.com/office/powerpoint/2010/main" val="1087069275"/>
       </p:ext>
     </p:extLst>
   </p:cSld>
@@ -22799,10 +22721,10 @@
       </p:sp>
       <p:pic>
         <p:nvPicPr>
-          <p:cNvPr id="3" name="Picture 2">
+          <p:cNvPr id="4" name="Picture 3">
             <a:extLst>
               <a:ext uri="{FF2B5EF4-FFF2-40B4-BE49-F238E27FC236}">
-                <a16:creationId xmlns:a16="http://schemas.microsoft.com/office/drawing/2014/main" id="{9907B5FD-AE5E-459B-AB25-6B077C7F17D4}"/>
+                <a16:creationId xmlns:a16="http://schemas.microsoft.com/office/drawing/2014/main" id="{6E285F43-4B9E-4544-959D-AC6B8E88D371}"/>
               </a:ext>
             </a:extLst>
           </p:cNvPr>
@@ -22819,8 +22741,8 @@
         </p:blipFill>
         <p:spPr>
           <a:xfrm>
-            <a:off x="1597816" y="1348835"/>
-            <a:ext cx="8996367" cy="5036670"/>
+            <a:off x="1375708" y="1130276"/>
+            <a:ext cx="9440583" cy="5255229"/>
           </a:xfrm>
           <a:prstGeom prst="rect">
             <a:avLst/>
@@ -22830,20 +22752,20 @@
     </p:spTree>
     <p:extLst>
       <p:ext uri="{BB962C8B-B14F-4D97-AF65-F5344CB8AC3E}">
-        <p14:creationId xmlns:p14="http://schemas.microsoft.com/office/powerpoint/2010/main" val="1132848265"/>
+        <p14:creationId xmlns:p14="http://schemas.microsoft.com/office/powerpoint/2010/main" val="3543594690"/>
       </p:ext>
     </p:extLst>
   </p:cSld>
   <p:clrMapOvr>
     <a:masterClrMapping/>
   </p:clrMapOvr>
-  <mc:AlternateContent xmlns:mc="http://schemas.openxmlformats.org/markup-compatibility/2006">
-    <mc:Choice xmlns:p14="http://schemas.microsoft.com/office/powerpoint/2010/main" Requires="p14">
+  <mc:AlternateContent xmlns:mc="http://schemas.openxmlformats.org/markup-compatibility/2006" xmlns:p14="http://schemas.microsoft.com/office/powerpoint/2010/main">
+    <mc:Choice Requires="p14">
       <p:transition spd="med" p14:dur="700">
         <p:fade/>
       </p:transition>
     </mc:Choice>
-    <mc:Fallback>
+    <mc:Fallback xmlns="">
       <p:transition spd="med">
         <p:fade/>
       </p:transition>
@@ -23142,7 +23064,7 @@
                 </a:effectLst>
                 <a:latin typeface="Nexa Bold" panose="02000000000000000000" pitchFamily="50" charset="0"/>
               </a:rPr>
-              <a:t>tài</a:t>
+              <a:t>quản</a:t>
             </a:r>
             <a:r>
               <a:rPr lang="en-US" sz="3500" dirty="0">
@@ -23174,7 +23096,7 @@
                 </a:effectLst>
                 <a:latin typeface="Nexa Bold" panose="02000000000000000000" pitchFamily="50" charset="0"/>
               </a:rPr>
-              <a:t>khoản</a:t>
+              <a:t>lý</a:t>
             </a:r>
             <a:r>
               <a:rPr lang="en-US" sz="3500" dirty="0">
@@ -23206,7 +23128,7 @@
                 </a:effectLst>
                 <a:latin typeface="Nexa Bold" panose="02000000000000000000" pitchFamily="50" charset="0"/>
               </a:rPr>
-              <a:t>cá</a:t>
+              <a:t>nhân</a:t>
             </a:r>
             <a:r>
               <a:rPr lang="en-US" sz="3500" dirty="0">
@@ -23238,7 +23160,103 @@
                 </a:effectLst>
                 <a:latin typeface="Nexa Bold" panose="02000000000000000000" pitchFamily="50" charset="0"/>
               </a:rPr>
-              <a:t>nhân</a:t>
+              <a:t>viên</a:t>
+            </a:r>
+            <a:r>
+              <a:rPr lang="en-US" sz="3500" dirty="0">
+                <a:solidFill>
+                  <a:schemeClr val="bg1"/>
+                </a:solidFill>
+                <a:effectLst>
+                  <a:outerShdw blurRad="1270000" dist="914400" dir="8100000" algn="tr" rotWithShape="0">
+                    <a:prstClr val="black">
+                      <a:alpha val="40000"/>
+                    </a:prstClr>
+                  </a:outerShdw>
+                </a:effectLst>
+                <a:latin typeface="Nexa Bold" panose="02000000000000000000" pitchFamily="50" charset="0"/>
+              </a:rPr>
+              <a:t> </a:t>
+            </a:r>
+            <a:r>
+              <a:rPr lang="en-US" sz="3500" dirty="0" err="1">
+                <a:solidFill>
+                  <a:schemeClr val="bg1"/>
+                </a:solidFill>
+                <a:effectLst>
+                  <a:outerShdw blurRad="1270000" dist="914400" dir="8100000" algn="tr" rotWithShape="0">
+                    <a:prstClr val="black">
+                      <a:alpha val="40000"/>
+                    </a:prstClr>
+                  </a:outerShdw>
+                </a:effectLst>
+                <a:latin typeface="Nexa Bold" panose="02000000000000000000" pitchFamily="50" charset="0"/>
+              </a:rPr>
+              <a:t>và</a:t>
+            </a:r>
+            <a:r>
+              <a:rPr lang="en-US" sz="3500" dirty="0">
+                <a:solidFill>
+                  <a:schemeClr val="bg1"/>
+                </a:solidFill>
+                <a:effectLst>
+                  <a:outerShdw blurRad="1270000" dist="914400" dir="8100000" algn="tr" rotWithShape="0">
+                    <a:prstClr val="black">
+                      <a:alpha val="40000"/>
+                    </a:prstClr>
+                  </a:outerShdw>
+                </a:effectLst>
+                <a:latin typeface="Nexa Bold" panose="02000000000000000000" pitchFamily="50" charset="0"/>
+              </a:rPr>
+              <a:t> </a:t>
+            </a:r>
+            <a:r>
+              <a:rPr lang="en-US" sz="3500" dirty="0" err="1">
+                <a:solidFill>
+                  <a:schemeClr val="bg1"/>
+                </a:solidFill>
+                <a:effectLst>
+                  <a:outerShdw blurRad="1270000" dist="914400" dir="8100000" algn="tr" rotWithShape="0">
+                    <a:prstClr val="black">
+                      <a:alpha val="40000"/>
+                    </a:prstClr>
+                  </a:outerShdw>
+                </a:effectLst>
+                <a:latin typeface="Nexa Bold" panose="02000000000000000000" pitchFamily="50" charset="0"/>
+              </a:rPr>
+              <a:t>chức</a:t>
+            </a:r>
+            <a:r>
+              <a:rPr lang="en-US" sz="3500" dirty="0">
+                <a:solidFill>
+                  <a:schemeClr val="bg1"/>
+                </a:solidFill>
+                <a:effectLst>
+                  <a:outerShdw blurRad="1270000" dist="914400" dir="8100000" algn="tr" rotWithShape="0">
+                    <a:prstClr val="black">
+                      <a:alpha val="40000"/>
+                    </a:prstClr>
+                  </a:outerShdw>
+                </a:effectLst>
+                <a:latin typeface="Nexa Bold" panose="02000000000000000000" pitchFamily="50" charset="0"/>
+              </a:rPr>
+              <a:t> </a:t>
+            </a:r>
+            <a:r>
+              <a:rPr lang="en-US" sz="3500" dirty="0" err="1">
+                <a:solidFill>
+                  <a:schemeClr val="bg1"/>
+                </a:solidFill>
+                <a:effectLst>
+                  <a:outerShdw blurRad="1270000" dist="914400" dir="8100000" algn="tr" rotWithShape="0">
+                    <a:prstClr val="black">
+                      <a:alpha val="40000"/>
+                    </a:prstClr>
+                  </a:outerShdw>
+                </a:effectLst>
+                <a:latin typeface="Nexa Bold" panose="02000000000000000000" pitchFamily="50" charset="0"/>
+              </a:rPr>
+              <a:t>vụ</a:t>
             </a:r>
             <a:endParaRPr lang="en-US" sz="3500" dirty="0">
               <a:solidFill>
@@ -23258,10 +23276,10 @@
       </p:sp>
       <p:pic>
         <p:nvPicPr>
-          <p:cNvPr id="4" name="Picture 3">
+          <p:cNvPr id="3" name="Picture 2">
             <a:extLst>
               <a:ext uri="{FF2B5EF4-FFF2-40B4-BE49-F238E27FC236}">
-                <a16:creationId xmlns:a16="http://schemas.microsoft.com/office/drawing/2014/main" id="{9227BFBA-2960-47C2-B9D7-FCD0B387645C}"/>
+                <a16:creationId xmlns:a16="http://schemas.microsoft.com/office/drawing/2014/main" id="{9907B5FD-AE5E-459B-AB25-6B077C7F17D4}"/>
               </a:ext>
             </a:extLst>
           </p:cNvPr>
@@ -23278,8 +23296,8 @@
         </p:blipFill>
         <p:spPr>
           <a:xfrm>
-            <a:off x="4225368" y="1326382"/>
-            <a:ext cx="3741264" cy="5254215"/>
+            <a:off x="1597816" y="1348835"/>
+            <a:ext cx="8996367" cy="5036670"/>
           </a:xfrm>
           <a:prstGeom prst="rect">
             <a:avLst/>
@@ -23289,7 +23307,7 @@
     </p:spTree>
     <p:extLst>
       <p:ext uri="{BB962C8B-B14F-4D97-AF65-F5344CB8AC3E}">
-        <p14:creationId xmlns:p14="http://schemas.microsoft.com/office/powerpoint/2010/main" val="3418658258"/>
+        <p14:creationId xmlns:p14="http://schemas.microsoft.com/office/powerpoint/2010/main" val="1132848265"/>
       </p:ext>
     </p:extLst>
   </p:cSld>
@@ -23601,6 +23619,465 @@
                 </a:effectLst>
                 <a:latin typeface="Nexa Bold" panose="02000000000000000000" pitchFamily="50" charset="0"/>
               </a:rPr>
+              <a:t>tài</a:t>
+            </a:r>
+            <a:r>
+              <a:rPr lang="en-US" sz="3500" dirty="0">
+                <a:solidFill>
+                  <a:schemeClr val="bg1"/>
+                </a:solidFill>
+                <a:effectLst>
+                  <a:outerShdw blurRad="1270000" dist="914400" dir="8100000" algn="tr" rotWithShape="0">
+                    <a:prstClr val="black">
+                      <a:alpha val="40000"/>
+                    </a:prstClr>
+                  </a:outerShdw>
+                </a:effectLst>
+                <a:latin typeface="Nexa Bold" panose="02000000000000000000" pitchFamily="50" charset="0"/>
+              </a:rPr>
+              <a:t> </a:t>
+            </a:r>
+            <a:r>
+              <a:rPr lang="en-US" sz="3500" dirty="0" err="1">
+                <a:solidFill>
+                  <a:schemeClr val="bg1"/>
+                </a:solidFill>
+                <a:effectLst>
+                  <a:outerShdw blurRad="1270000" dist="914400" dir="8100000" algn="tr" rotWithShape="0">
+                    <a:prstClr val="black">
+                      <a:alpha val="40000"/>
+                    </a:prstClr>
+                  </a:outerShdw>
+                </a:effectLst>
+                <a:latin typeface="Nexa Bold" panose="02000000000000000000" pitchFamily="50" charset="0"/>
+              </a:rPr>
+              <a:t>khoản</a:t>
+            </a:r>
+            <a:r>
+              <a:rPr lang="en-US" sz="3500" dirty="0">
+                <a:solidFill>
+                  <a:schemeClr val="bg1"/>
+                </a:solidFill>
+                <a:effectLst>
+                  <a:outerShdw blurRad="1270000" dist="914400" dir="8100000" algn="tr" rotWithShape="0">
+                    <a:prstClr val="black">
+                      <a:alpha val="40000"/>
+                    </a:prstClr>
+                  </a:outerShdw>
+                </a:effectLst>
+                <a:latin typeface="Nexa Bold" panose="02000000000000000000" pitchFamily="50" charset="0"/>
+              </a:rPr>
+              <a:t> </a:t>
+            </a:r>
+            <a:r>
+              <a:rPr lang="en-US" sz="3500" dirty="0" err="1">
+                <a:solidFill>
+                  <a:schemeClr val="bg1"/>
+                </a:solidFill>
+                <a:effectLst>
+                  <a:outerShdw blurRad="1270000" dist="914400" dir="8100000" algn="tr" rotWithShape="0">
+                    <a:prstClr val="black">
+                      <a:alpha val="40000"/>
+                    </a:prstClr>
+                  </a:outerShdw>
+                </a:effectLst>
+                <a:latin typeface="Nexa Bold" panose="02000000000000000000" pitchFamily="50" charset="0"/>
+              </a:rPr>
+              <a:t>cá</a:t>
+            </a:r>
+            <a:r>
+              <a:rPr lang="en-US" sz="3500" dirty="0">
+                <a:solidFill>
+                  <a:schemeClr val="bg1"/>
+                </a:solidFill>
+                <a:effectLst>
+                  <a:outerShdw blurRad="1270000" dist="914400" dir="8100000" algn="tr" rotWithShape="0">
+                    <a:prstClr val="black">
+                      <a:alpha val="40000"/>
+                    </a:prstClr>
+                  </a:outerShdw>
+                </a:effectLst>
+                <a:latin typeface="Nexa Bold" panose="02000000000000000000" pitchFamily="50" charset="0"/>
+              </a:rPr>
+              <a:t> </a:t>
+            </a:r>
+            <a:r>
+              <a:rPr lang="en-US" sz="3500" dirty="0" err="1">
+                <a:solidFill>
+                  <a:schemeClr val="bg1"/>
+                </a:solidFill>
+                <a:effectLst>
+                  <a:outerShdw blurRad="1270000" dist="914400" dir="8100000" algn="tr" rotWithShape="0">
+                    <a:prstClr val="black">
+                      <a:alpha val="40000"/>
+                    </a:prstClr>
+                  </a:outerShdw>
+                </a:effectLst>
+                <a:latin typeface="Nexa Bold" panose="02000000000000000000" pitchFamily="50" charset="0"/>
+              </a:rPr>
+              <a:t>nhân</a:t>
+            </a:r>
+            <a:endParaRPr lang="en-US" sz="3500" dirty="0">
+              <a:solidFill>
+                <a:schemeClr val="bg1"/>
+              </a:solidFill>
+              <a:effectLst>
+                <a:outerShdw blurRad="1270000" dist="914400" dir="8100000" algn="tr" rotWithShape="0">
+                  <a:prstClr val="black">
+                    <a:alpha val="40000"/>
+                  </a:prstClr>
+                </a:outerShdw>
+              </a:effectLst>
+              <a:latin typeface="Nexa Bold" panose="02000000000000000000" pitchFamily="50" charset="0"/>
+            </a:endParaRPr>
+          </a:p>
+        </p:txBody>
+      </p:sp>
+      <p:pic>
+        <p:nvPicPr>
+          <p:cNvPr id="4" name="Picture 3">
+            <a:extLst>
+              <a:ext uri="{FF2B5EF4-FFF2-40B4-BE49-F238E27FC236}">
+                <a16:creationId xmlns:a16="http://schemas.microsoft.com/office/drawing/2014/main" id="{9227BFBA-2960-47C2-B9D7-FCD0B387645C}"/>
+              </a:ext>
+            </a:extLst>
+          </p:cNvPr>
+          <p:cNvPicPr>
+            <a:picLocks noChangeAspect="1"/>
+          </p:cNvPicPr>
+          <p:nvPr/>
+        </p:nvPicPr>
+        <p:blipFill>
+          <a:blip r:embed="rId2"/>
+          <a:stretch>
+            <a:fillRect/>
+          </a:stretch>
+        </p:blipFill>
+        <p:spPr>
+          <a:xfrm>
+            <a:off x="4225368" y="1326382"/>
+            <a:ext cx="3741264" cy="5254215"/>
+          </a:xfrm>
+          <a:prstGeom prst="rect">
+            <a:avLst/>
+          </a:prstGeom>
+        </p:spPr>
+      </p:pic>
+    </p:spTree>
+    <p:extLst>
+      <p:ext uri="{BB962C8B-B14F-4D97-AF65-F5344CB8AC3E}">
+        <p14:creationId xmlns:p14="http://schemas.microsoft.com/office/powerpoint/2010/main" val="3418658258"/>
+      </p:ext>
+    </p:extLst>
+  </p:cSld>
+  <p:clrMapOvr>
+    <a:masterClrMapping/>
+  </p:clrMapOvr>
+  <mc:AlternateContent xmlns:mc="http://schemas.openxmlformats.org/markup-compatibility/2006" xmlns:p14="http://schemas.microsoft.com/office/powerpoint/2010/main">
+    <mc:Choice Requires="p14">
+      <p:transition spd="med" p14:dur="700">
+        <p:fade/>
+      </p:transition>
+    </mc:Choice>
+    <mc:Fallback xmlns="">
+      <p:transition spd="med">
+        <p:fade/>
+      </p:transition>
+    </mc:Fallback>
+  </mc:AlternateContent>
+</p:sld>
+</file>
+
+<file path=ppt/slides/slide27.xml><?xml version="1.0" encoding="utf-8"?>
+<p:sld xmlns:a="http://schemas.openxmlformats.org/drawingml/2006/main" xmlns:r="http://schemas.openxmlformats.org/officeDocument/2006/relationships" xmlns:p="http://schemas.openxmlformats.org/presentationml/2006/main">
+  <p:cSld>
+    <p:bg>
+      <p:bgPr>
+        <a:gradFill>
+          <a:gsLst>
+            <a:gs pos="2000">
+              <a:srgbClr val="2E3252"/>
+            </a:gs>
+            <a:gs pos="100000">
+              <a:srgbClr val="161828"/>
+            </a:gs>
+          </a:gsLst>
+          <a:path path="circle">
+            <a:fillToRect l="50000" t="-80000" r="50000" b="180000"/>
+          </a:path>
+        </a:gradFill>
+        <a:effectLst/>
+      </p:bgPr>
+    </p:bg>
+    <p:spTree>
+      <p:nvGrpSpPr>
+        <p:cNvPr id="1" name=""/>
+        <p:cNvGrpSpPr/>
+        <p:nvPr/>
+      </p:nvGrpSpPr>
+      <p:grpSpPr>
+        <a:xfrm>
+          <a:off x="0" y="0"/>
+          <a:ext cx="0" cy="0"/>
+          <a:chOff x="0" y="0"/>
+          <a:chExt cx="0" cy="0"/>
+        </a:xfrm>
+      </p:grpSpPr>
+      <p:sp>
+        <p:nvSpPr>
+          <p:cNvPr id="23" name="Text Placeholder 2">
+            <a:extLst>
+              <a:ext uri="{FF2B5EF4-FFF2-40B4-BE49-F238E27FC236}">
+                <a16:creationId xmlns:a16="http://schemas.microsoft.com/office/drawing/2014/main" id="{FCC5AEA3-E773-4E46-8981-C20B63CC3B7E}"/>
+              </a:ext>
+            </a:extLst>
+          </p:cNvPr>
+          <p:cNvSpPr txBox="1">
+            <a:spLocks/>
+          </p:cNvSpPr>
+          <p:nvPr/>
+        </p:nvSpPr>
+        <p:spPr>
+          <a:xfrm>
+            <a:off x="0" y="472495"/>
+            <a:ext cx="12192001" cy="518105"/>
+          </a:xfrm>
+          <a:prstGeom prst="rect">
+            <a:avLst/>
+          </a:prstGeom>
+        </p:spPr>
+        <p:txBody>
+          <a:bodyPr/>
+          <a:lstStyle>
+            <a:lvl1pPr marL="0" indent="0" algn="ctr" defTabSz="1460754" rtl="0" eaLnBrk="1" latinLnBrk="0" hangingPunct="1">
+              <a:lnSpc>
+                <a:spcPct val="90000"/>
+              </a:lnSpc>
+              <a:spcBef>
+                <a:spcPts val="1598"/>
+              </a:spcBef>
+              <a:buFont typeface="Arial" panose="020B0604020202020204" pitchFamily="34" charset="0"/>
+              <a:buNone/>
+              <a:defRPr sz="4000" kern="1200">
+                <a:solidFill>
+                  <a:schemeClr val="tx1">
+                    <a:lumMod val="65000"/>
+                    <a:lumOff val="35000"/>
+                  </a:schemeClr>
+                </a:solidFill>
+                <a:latin typeface="+mn-lt"/>
+                <a:ea typeface="+mn-ea"/>
+                <a:cs typeface="+mn-cs"/>
+              </a:defRPr>
+            </a:lvl1pPr>
+            <a:lvl2pPr marL="1095566" indent="-365189" algn="l" defTabSz="1460754" rtl="0" eaLnBrk="1" latinLnBrk="0" hangingPunct="1">
+              <a:lnSpc>
+                <a:spcPct val="90000"/>
+              </a:lnSpc>
+              <a:spcBef>
+                <a:spcPts val="799"/>
+              </a:spcBef>
+              <a:buFont typeface="Arial" panose="020B0604020202020204" pitchFamily="34" charset="0"/>
+              <a:buChar char="•"/>
+              <a:defRPr sz="3834" kern="1200">
+                <a:solidFill>
+                  <a:schemeClr val="tx1"/>
+                </a:solidFill>
+                <a:latin typeface="+mn-lt"/>
+                <a:ea typeface="+mn-ea"/>
+                <a:cs typeface="+mn-cs"/>
+              </a:defRPr>
+            </a:lvl2pPr>
+            <a:lvl3pPr marL="1825943" indent="-365189" algn="l" defTabSz="1460754" rtl="0" eaLnBrk="1" latinLnBrk="0" hangingPunct="1">
+              <a:lnSpc>
+                <a:spcPct val="90000"/>
+              </a:lnSpc>
+              <a:spcBef>
+                <a:spcPts val="799"/>
+              </a:spcBef>
+              <a:buFont typeface="Arial" panose="020B0604020202020204" pitchFamily="34" charset="0"/>
+              <a:buChar char="•"/>
+              <a:defRPr sz="3195" kern="1200">
+                <a:solidFill>
+                  <a:schemeClr val="tx1"/>
+                </a:solidFill>
+                <a:latin typeface="+mn-lt"/>
+                <a:ea typeface="+mn-ea"/>
+                <a:cs typeface="+mn-cs"/>
+              </a:defRPr>
+            </a:lvl3pPr>
+            <a:lvl4pPr marL="2556320" indent="-365189" algn="l" defTabSz="1460754" rtl="0" eaLnBrk="1" latinLnBrk="0" hangingPunct="1">
+              <a:lnSpc>
+                <a:spcPct val="90000"/>
+              </a:lnSpc>
+              <a:spcBef>
+                <a:spcPts val="799"/>
+              </a:spcBef>
+              <a:buFont typeface="Arial" panose="020B0604020202020204" pitchFamily="34" charset="0"/>
+              <a:buChar char="•"/>
+              <a:defRPr sz="2876" kern="1200">
+                <a:solidFill>
+                  <a:schemeClr val="tx1"/>
+                </a:solidFill>
+                <a:latin typeface="+mn-lt"/>
+                <a:ea typeface="+mn-ea"/>
+                <a:cs typeface="+mn-cs"/>
+              </a:defRPr>
+            </a:lvl4pPr>
+            <a:lvl5pPr marL="3286697" indent="-365189" algn="l" defTabSz="1460754" rtl="0" eaLnBrk="1" latinLnBrk="0" hangingPunct="1">
+              <a:lnSpc>
+                <a:spcPct val="90000"/>
+              </a:lnSpc>
+              <a:spcBef>
+                <a:spcPts val="799"/>
+              </a:spcBef>
+              <a:buFont typeface="Arial" panose="020B0604020202020204" pitchFamily="34" charset="0"/>
+              <a:buChar char="•"/>
+              <a:defRPr sz="2876" kern="1200">
+                <a:solidFill>
+                  <a:schemeClr val="tx1"/>
+                </a:solidFill>
+                <a:latin typeface="+mn-lt"/>
+                <a:ea typeface="+mn-ea"/>
+                <a:cs typeface="+mn-cs"/>
+              </a:defRPr>
+            </a:lvl5pPr>
+            <a:lvl6pPr marL="4017074" indent="-365189" algn="l" defTabSz="1460754" rtl="0" eaLnBrk="1" latinLnBrk="0" hangingPunct="1">
+              <a:lnSpc>
+                <a:spcPct val="90000"/>
+              </a:lnSpc>
+              <a:spcBef>
+                <a:spcPts val="799"/>
+              </a:spcBef>
+              <a:buFont typeface="Arial" panose="020B0604020202020204" pitchFamily="34" charset="0"/>
+              <a:buChar char="•"/>
+              <a:defRPr sz="2876" kern="1200">
+                <a:solidFill>
+                  <a:schemeClr val="tx1"/>
+                </a:solidFill>
+                <a:latin typeface="+mn-lt"/>
+                <a:ea typeface="+mn-ea"/>
+                <a:cs typeface="+mn-cs"/>
+              </a:defRPr>
+            </a:lvl6pPr>
+            <a:lvl7pPr marL="4747451" indent="-365189" algn="l" defTabSz="1460754" rtl="0" eaLnBrk="1" latinLnBrk="0" hangingPunct="1">
+              <a:lnSpc>
+                <a:spcPct val="90000"/>
+              </a:lnSpc>
+              <a:spcBef>
+                <a:spcPts val="799"/>
+              </a:spcBef>
+              <a:buFont typeface="Arial" panose="020B0604020202020204" pitchFamily="34" charset="0"/>
+              <a:buChar char="•"/>
+              <a:defRPr sz="2876" kern="1200">
+                <a:solidFill>
+                  <a:schemeClr val="tx1"/>
+                </a:solidFill>
+                <a:latin typeface="+mn-lt"/>
+                <a:ea typeface="+mn-ea"/>
+                <a:cs typeface="+mn-cs"/>
+              </a:defRPr>
+            </a:lvl7pPr>
+            <a:lvl8pPr marL="5477828" indent="-365189" algn="l" defTabSz="1460754" rtl="0" eaLnBrk="1" latinLnBrk="0" hangingPunct="1">
+              <a:lnSpc>
+                <a:spcPct val="90000"/>
+              </a:lnSpc>
+              <a:spcBef>
+                <a:spcPts val="799"/>
+              </a:spcBef>
+              <a:buFont typeface="Arial" panose="020B0604020202020204" pitchFamily="34" charset="0"/>
+              <a:buChar char="•"/>
+              <a:defRPr sz="2876" kern="1200">
+                <a:solidFill>
+                  <a:schemeClr val="tx1"/>
+                </a:solidFill>
+                <a:latin typeface="+mn-lt"/>
+                <a:ea typeface="+mn-ea"/>
+                <a:cs typeface="+mn-cs"/>
+              </a:defRPr>
+            </a:lvl8pPr>
+            <a:lvl9pPr marL="6208205" indent="-365189" algn="l" defTabSz="1460754" rtl="0" eaLnBrk="1" latinLnBrk="0" hangingPunct="1">
+              <a:lnSpc>
+                <a:spcPct val="90000"/>
+              </a:lnSpc>
+              <a:spcBef>
+                <a:spcPts val="799"/>
+              </a:spcBef>
+              <a:buFont typeface="Arial" panose="020B0604020202020204" pitchFamily="34" charset="0"/>
+              <a:buChar char="•"/>
+              <a:defRPr sz="2876" kern="1200">
+                <a:solidFill>
+                  <a:schemeClr val="tx1"/>
+                </a:solidFill>
+                <a:latin typeface="+mn-lt"/>
+                <a:ea typeface="+mn-ea"/>
+                <a:cs typeface="+mn-cs"/>
+              </a:defRPr>
+            </a:lvl9pPr>
+          </a:lstStyle>
+          <a:p>
+            <a:r>
+              <a:rPr lang="en-US" sz="3500" dirty="0">
+                <a:solidFill>
+                  <a:schemeClr val="bg1"/>
+                </a:solidFill>
+                <a:effectLst>
+                  <a:outerShdw blurRad="1270000" dist="914400" dir="8100000" algn="tr" rotWithShape="0">
+                    <a:prstClr val="black">
+                      <a:alpha val="40000"/>
+                    </a:prstClr>
+                  </a:outerShdw>
+                </a:effectLst>
+                <a:latin typeface="Nexa Bold" panose="02000000000000000000" pitchFamily="50" charset="0"/>
+              </a:rPr>
+              <a:t>Giao </a:t>
+            </a:r>
+            <a:r>
+              <a:rPr lang="en-US" sz="3500" dirty="0" err="1">
+                <a:solidFill>
+                  <a:schemeClr val="bg1"/>
+                </a:solidFill>
+                <a:effectLst>
+                  <a:outerShdw blurRad="1270000" dist="914400" dir="8100000" algn="tr" rotWithShape="0">
+                    <a:prstClr val="black">
+                      <a:alpha val="40000"/>
+                    </a:prstClr>
+                  </a:outerShdw>
+                </a:effectLst>
+                <a:latin typeface="Nexa Bold" panose="02000000000000000000" pitchFamily="50" charset="0"/>
+              </a:rPr>
+              <a:t>diện</a:t>
+            </a:r>
+            <a:r>
+              <a:rPr lang="en-US" sz="3500" dirty="0">
+                <a:solidFill>
+                  <a:schemeClr val="bg1"/>
+                </a:solidFill>
+                <a:effectLst>
+                  <a:outerShdw blurRad="1270000" dist="914400" dir="8100000" algn="tr" rotWithShape="0">
+                    <a:prstClr val="black">
+                      <a:alpha val="40000"/>
+                    </a:prstClr>
+                  </a:outerShdw>
+                </a:effectLst>
+                <a:latin typeface="Nexa Bold" panose="02000000000000000000" pitchFamily="50" charset="0"/>
+              </a:rPr>
+              <a:t> </a:t>
+            </a:r>
+            <a:r>
+              <a:rPr lang="en-US" sz="3500" dirty="0" err="1">
+                <a:solidFill>
+                  <a:schemeClr val="bg1"/>
+                </a:solidFill>
+                <a:effectLst>
+                  <a:outerShdw blurRad="1270000" dist="914400" dir="8100000" algn="tr" rotWithShape="0">
+                    <a:prstClr val="black">
+                      <a:alpha val="40000"/>
+                    </a:prstClr>
+                  </a:outerShdw>
+                </a:effectLst>
+                <a:latin typeface="Nexa Bold" panose="02000000000000000000" pitchFamily="50" charset="0"/>
+              </a:rPr>
               <a:t>thống</a:t>
             </a:r>
             <a:r>
@@ -23770,7 +24247,7 @@
 </p:sld>
 </file>
 
-<file path=ppt/slides/slide27.xml><?xml version="1.0" encoding="utf-8"?>
+<file path=ppt/slides/slide28.xml><?xml version="1.0" encoding="utf-8"?>
 <p:sld xmlns:a="http://schemas.openxmlformats.org/drawingml/2006/main" xmlns:r="http://schemas.openxmlformats.org/officeDocument/2006/relationships" xmlns:p="http://schemas.openxmlformats.org/presentationml/2006/main">
   <p:cSld>
     <p:spTree>
@@ -24362,7 +24839,7 @@
 </p:sld>
 </file>
 
-<file path=ppt/slides/slide28.xml><?xml version="1.0" encoding="utf-8"?>
+<file path=ppt/slides/slide29.xml><?xml version="1.0" encoding="utf-8"?>
 <p:sld xmlns:a="http://schemas.openxmlformats.org/drawingml/2006/main" xmlns:r="http://schemas.openxmlformats.org/officeDocument/2006/relationships" xmlns:p="http://schemas.openxmlformats.org/presentationml/2006/main">
   <p:cSld>
     <p:spTree>
@@ -25644,580 +26121,6 @@
     </mc:Choice>
     <mc:Fallback xmlns="">
       <p:transition spd="med">
-        <p:fade/>
-      </p:transition>
-    </mc:Fallback>
-  </mc:AlternateContent>
-</p:sld>
-</file>
-
-<file path=ppt/slides/slide29.xml><?xml version="1.0" encoding="utf-8"?>
-<p:sld xmlns:a="http://schemas.openxmlformats.org/drawingml/2006/main" xmlns:r="http://schemas.openxmlformats.org/officeDocument/2006/relationships" xmlns:p="http://schemas.openxmlformats.org/presentationml/2006/main">
-  <p:cSld>
-    <p:spTree>
-      <p:nvGrpSpPr>
-        <p:cNvPr id="1" name=""/>
-        <p:cNvGrpSpPr/>
-        <p:nvPr/>
-      </p:nvGrpSpPr>
-      <p:grpSpPr>
-        <a:xfrm>
-          <a:off x="0" y="0"/>
-          <a:ext cx="0" cy="0"/>
-          <a:chOff x="0" y="0"/>
-          <a:chExt cx="0" cy="0"/>
-        </a:xfrm>
-      </p:grpSpPr>
-      <p:sp>
-        <p:nvSpPr>
-          <p:cNvPr id="2" name="Rectangle 2">
-            <a:extLst>
-              <a:ext uri="{FF2B5EF4-FFF2-40B4-BE49-F238E27FC236}">
-                <a16:creationId xmlns:a16="http://schemas.microsoft.com/office/drawing/2014/main" id="{221AC957-E7F8-4915-BB68-E3D8D4295682}"/>
-              </a:ext>
-            </a:extLst>
-          </p:cNvPr>
-          <p:cNvSpPr/>
-          <p:nvPr/>
-        </p:nvSpPr>
-        <p:spPr>
-          <a:xfrm flipV="1">
-            <a:off x="9426" y="15447"/>
-            <a:ext cx="12173149" cy="5407874"/>
-          </a:xfrm>
-          <a:custGeom>
-            <a:avLst/>
-            <a:gdLst>
-              <a:gd name="connsiteX0" fmla="*/ 0 w 19477038"/>
-              <a:gd name="connsiteY0" fmla="*/ 0 h 8229600"/>
-              <a:gd name="connsiteX1" fmla="*/ 19477038 w 19477038"/>
-              <a:gd name="connsiteY1" fmla="*/ 0 h 8229600"/>
-              <a:gd name="connsiteX2" fmla="*/ 19477038 w 19477038"/>
-              <a:gd name="connsiteY2" fmla="*/ 8229600 h 8229600"/>
-              <a:gd name="connsiteX3" fmla="*/ 0 w 19477038"/>
-              <a:gd name="connsiteY3" fmla="*/ 8229600 h 8229600"/>
-              <a:gd name="connsiteX4" fmla="*/ 0 w 19477038"/>
-              <a:gd name="connsiteY4" fmla="*/ 0 h 8229600"/>
-              <a:gd name="connsiteX0" fmla="*/ 0 w 19477038"/>
-              <a:gd name="connsiteY0" fmla="*/ 550606 h 8780206"/>
-              <a:gd name="connsiteX1" fmla="*/ 19477038 w 19477038"/>
-              <a:gd name="connsiteY1" fmla="*/ 550606 h 8780206"/>
-              <a:gd name="connsiteX2" fmla="*/ 19477038 w 19477038"/>
-              <a:gd name="connsiteY2" fmla="*/ 8780206 h 8780206"/>
-              <a:gd name="connsiteX3" fmla="*/ 0 w 19477038"/>
-              <a:gd name="connsiteY3" fmla="*/ 8780206 h 8780206"/>
-              <a:gd name="connsiteX4" fmla="*/ 0 w 19477038"/>
-              <a:gd name="connsiteY4" fmla="*/ 550606 h 8780206"/>
-              <a:gd name="connsiteX0" fmla="*/ 0 w 19477038"/>
-              <a:gd name="connsiteY0" fmla="*/ 284740 h 8514340"/>
-              <a:gd name="connsiteX1" fmla="*/ 19477038 w 19477038"/>
-              <a:gd name="connsiteY1" fmla="*/ 284740 h 8514340"/>
-              <a:gd name="connsiteX2" fmla="*/ 19477038 w 19477038"/>
-              <a:gd name="connsiteY2" fmla="*/ 8514340 h 8514340"/>
-              <a:gd name="connsiteX3" fmla="*/ 0 w 19477038"/>
-              <a:gd name="connsiteY3" fmla="*/ 8514340 h 8514340"/>
-              <a:gd name="connsiteX4" fmla="*/ 0 w 19477038"/>
-              <a:gd name="connsiteY4" fmla="*/ 284740 h 8514340"/>
-              <a:gd name="connsiteX0" fmla="*/ 0 w 19477038"/>
-              <a:gd name="connsiteY0" fmla="*/ 422999 h 8652599"/>
-              <a:gd name="connsiteX1" fmla="*/ 19477038 w 19477038"/>
-              <a:gd name="connsiteY1" fmla="*/ 422999 h 8652599"/>
-              <a:gd name="connsiteX2" fmla="*/ 19477038 w 19477038"/>
-              <a:gd name="connsiteY2" fmla="*/ 8652599 h 8652599"/>
-              <a:gd name="connsiteX3" fmla="*/ 0 w 19477038"/>
-              <a:gd name="connsiteY3" fmla="*/ 8652599 h 8652599"/>
-              <a:gd name="connsiteX4" fmla="*/ 0 w 19477038"/>
-              <a:gd name="connsiteY4" fmla="*/ 422999 h 8652599"/>
-            </a:gdLst>
-            <a:ahLst/>
-            <a:cxnLst>
-              <a:cxn ang="0">
-                <a:pos x="connsiteX0" y="connsiteY0"/>
-              </a:cxn>
-              <a:cxn ang="0">
-                <a:pos x="connsiteX1" y="connsiteY1"/>
-              </a:cxn>
-              <a:cxn ang="0">
-                <a:pos x="connsiteX2" y="connsiteY2"/>
-              </a:cxn>
-              <a:cxn ang="0">
-                <a:pos x="connsiteX3" y="connsiteY3"/>
-              </a:cxn>
-              <a:cxn ang="0">
-                <a:pos x="connsiteX4" y="connsiteY4"/>
-              </a:cxn>
-            </a:cxnLst>
-            <a:rect l="l" t="t" r="r" b="b"/>
-            <a:pathLst>
-              <a:path w="19477038" h="8652599">
-                <a:moveTo>
-                  <a:pt x="0" y="422999"/>
-                </a:moveTo>
-                <a:cubicBezTo>
-                  <a:pt x="7406746" y="-1199323"/>
-                  <a:pt x="12276770" y="2517270"/>
-                  <a:pt x="19477038" y="422999"/>
-                </a:cubicBezTo>
-                <a:lnTo>
-                  <a:pt x="19477038" y="8652599"/>
-                </a:lnTo>
-                <a:lnTo>
-                  <a:pt x="0" y="8652599"/>
-                </a:lnTo>
-                <a:lnTo>
-                  <a:pt x="0" y="422999"/>
-                </a:lnTo>
-                <a:close/>
-              </a:path>
-            </a:pathLst>
-          </a:custGeom>
-          <a:solidFill>
-            <a:schemeClr val="accent1">
-              <a:alpha val="48000"/>
-            </a:schemeClr>
-          </a:solidFill>
-          <a:ln>
-            <a:noFill/>
-          </a:ln>
-        </p:spPr>
-        <p:style>
-          <a:lnRef idx="2">
-            <a:schemeClr val="accent1">
-              <a:shade val="50000"/>
-            </a:schemeClr>
-          </a:lnRef>
-          <a:fillRef idx="1">
-            <a:schemeClr val="accent1"/>
-          </a:fillRef>
-          <a:effectRef idx="0">
-            <a:schemeClr val="accent1"/>
-          </a:effectRef>
-          <a:fontRef idx="minor">
-            <a:schemeClr val="lt1"/>
-          </a:fontRef>
-        </p:style>
-        <p:txBody>
-          <a:bodyPr rtlCol="0" anchor="ctr"/>
-          <a:lstStyle/>
-          <a:p>
-            <a:pPr algn="ctr"/>
-            <a:endParaRPr lang="id-ID" sz="1125"/>
-          </a:p>
-        </p:txBody>
-      </p:sp>
-      <p:sp>
-        <p:nvSpPr>
-          <p:cNvPr id="3" name="Rectangle 2">
-            <a:extLst>
-              <a:ext uri="{FF2B5EF4-FFF2-40B4-BE49-F238E27FC236}">
-                <a16:creationId xmlns:a16="http://schemas.microsoft.com/office/drawing/2014/main" id="{5A08CAD9-15C6-4D2F-95C4-9D8E26663692}"/>
-              </a:ext>
-            </a:extLst>
-          </p:cNvPr>
-          <p:cNvSpPr/>
-          <p:nvPr/>
-        </p:nvSpPr>
-        <p:spPr>
-          <a:xfrm flipH="1" flipV="1">
-            <a:off x="9426" y="0"/>
-            <a:ext cx="12173149" cy="5419781"/>
-          </a:xfrm>
-          <a:custGeom>
-            <a:avLst/>
-            <a:gdLst>
-              <a:gd name="connsiteX0" fmla="*/ 0 w 19477038"/>
-              <a:gd name="connsiteY0" fmla="*/ 0 h 8229600"/>
-              <a:gd name="connsiteX1" fmla="*/ 19477038 w 19477038"/>
-              <a:gd name="connsiteY1" fmla="*/ 0 h 8229600"/>
-              <a:gd name="connsiteX2" fmla="*/ 19477038 w 19477038"/>
-              <a:gd name="connsiteY2" fmla="*/ 8229600 h 8229600"/>
-              <a:gd name="connsiteX3" fmla="*/ 0 w 19477038"/>
-              <a:gd name="connsiteY3" fmla="*/ 8229600 h 8229600"/>
-              <a:gd name="connsiteX4" fmla="*/ 0 w 19477038"/>
-              <a:gd name="connsiteY4" fmla="*/ 0 h 8229600"/>
-              <a:gd name="connsiteX0" fmla="*/ 0 w 19477038"/>
-              <a:gd name="connsiteY0" fmla="*/ 550606 h 8780206"/>
-              <a:gd name="connsiteX1" fmla="*/ 19477038 w 19477038"/>
-              <a:gd name="connsiteY1" fmla="*/ 550606 h 8780206"/>
-              <a:gd name="connsiteX2" fmla="*/ 19477038 w 19477038"/>
-              <a:gd name="connsiteY2" fmla="*/ 8780206 h 8780206"/>
-              <a:gd name="connsiteX3" fmla="*/ 0 w 19477038"/>
-              <a:gd name="connsiteY3" fmla="*/ 8780206 h 8780206"/>
-              <a:gd name="connsiteX4" fmla="*/ 0 w 19477038"/>
-              <a:gd name="connsiteY4" fmla="*/ 550606 h 8780206"/>
-              <a:gd name="connsiteX0" fmla="*/ 0 w 19477038"/>
-              <a:gd name="connsiteY0" fmla="*/ 284740 h 8514340"/>
-              <a:gd name="connsiteX1" fmla="*/ 19477038 w 19477038"/>
-              <a:gd name="connsiteY1" fmla="*/ 284740 h 8514340"/>
-              <a:gd name="connsiteX2" fmla="*/ 19477038 w 19477038"/>
-              <a:gd name="connsiteY2" fmla="*/ 8514340 h 8514340"/>
-              <a:gd name="connsiteX3" fmla="*/ 0 w 19477038"/>
-              <a:gd name="connsiteY3" fmla="*/ 8514340 h 8514340"/>
-              <a:gd name="connsiteX4" fmla="*/ 0 w 19477038"/>
-              <a:gd name="connsiteY4" fmla="*/ 284740 h 8514340"/>
-              <a:gd name="connsiteX0" fmla="*/ 0 w 19477038"/>
-              <a:gd name="connsiteY0" fmla="*/ 422999 h 8652599"/>
-              <a:gd name="connsiteX1" fmla="*/ 19477038 w 19477038"/>
-              <a:gd name="connsiteY1" fmla="*/ 422999 h 8652599"/>
-              <a:gd name="connsiteX2" fmla="*/ 19477038 w 19477038"/>
-              <a:gd name="connsiteY2" fmla="*/ 8652599 h 8652599"/>
-              <a:gd name="connsiteX3" fmla="*/ 0 w 19477038"/>
-              <a:gd name="connsiteY3" fmla="*/ 8652599 h 8652599"/>
-              <a:gd name="connsiteX4" fmla="*/ 0 w 19477038"/>
-              <a:gd name="connsiteY4" fmla="*/ 422999 h 8652599"/>
-            </a:gdLst>
-            <a:ahLst/>
-            <a:cxnLst>
-              <a:cxn ang="0">
-                <a:pos x="connsiteX0" y="connsiteY0"/>
-              </a:cxn>
-              <a:cxn ang="0">
-                <a:pos x="connsiteX1" y="connsiteY1"/>
-              </a:cxn>
-              <a:cxn ang="0">
-                <a:pos x="connsiteX2" y="connsiteY2"/>
-              </a:cxn>
-              <a:cxn ang="0">
-                <a:pos x="connsiteX3" y="connsiteY3"/>
-              </a:cxn>
-              <a:cxn ang="0">
-                <a:pos x="connsiteX4" y="connsiteY4"/>
-              </a:cxn>
-            </a:cxnLst>
-            <a:rect l="l" t="t" r="r" b="b"/>
-            <a:pathLst>
-              <a:path w="19477038" h="8652599">
-                <a:moveTo>
-                  <a:pt x="0" y="422999"/>
-                </a:moveTo>
-                <a:cubicBezTo>
-                  <a:pt x="7406746" y="-1199323"/>
-                  <a:pt x="12276770" y="2517270"/>
-                  <a:pt x="19477038" y="422999"/>
-                </a:cubicBezTo>
-                <a:lnTo>
-                  <a:pt x="19477038" y="8652599"/>
-                </a:lnTo>
-                <a:lnTo>
-                  <a:pt x="0" y="8652599"/>
-                </a:lnTo>
-                <a:lnTo>
-                  <a:pt x="0" y="422999"/>
-                </a:lnTo>
-                <a:close/>
-              </a:path>
-            </a:pathLst>
-          </a:custGeom>
-          <a:gradFill flip="none" rotWithShape="1">
-            <a:gsLst>
-              <a:gs pos="1000">
-                <a:schemeClr val="accent1"/>
-              </a:gs>
-              <a:gs pos="100000">
-                <a:schemeClr val="accent5"/>
-              </a:gs>
-            </a:gsLst>
-            <a:lin ang="2700000" scaled="1"/>
-            <a:tileRect/>
-          </a:gradFill>
-          <a:ln>
-            <a:noFill/>
-          </a:ln>
-        </p:spPr>
-        <p:style>
-          <a:lnRef idx="2">
-            <a:schemeClr val="accent1">
-              <a:shade val="50000"/>
-            </a:schemeClr>
-          </a:lnRef>
-          <a:fillRef idx="1">
-            <a:schemeClr val="accent1"/>
-          </a:fillRef>
-          <a:effectRef idx="0">
-            <a:schemeClr val="accent1"/>
-          </a:effectRef>
-          <a:fontRef idx="minor">
-            <a:schemeClr val="lt1"/>
-          </a:fontRef>
-        </p:style>
-        <p:txBody>
-          <a:bodyPr rtlCol="0" anchor="ctr"/>
-          <a:lstStyle/>
-          <a:p>
-            <a:pPr algn="ctr"/>
-            <a:endParaRPr lang="id-ID" sz="1125"/>
-          </a:p>
-        </p:txBody>
-      </p:sp>
-      <p:sp>
-        <p:nvSpPr>
-          <p:cNvPr id="8" name="Text">
-            <a:extLst>
-              <a:ext uri="{FF2B5EF4-FFF2-40B4-BE49-F238E27FC236}">
-                <a16:creationId xmlns:a16="http://schemas.microsoft.com/office/drawing/2014/main" id="{0EE4339D-A1D2-4FF3-AEF6-875A808CC359}"/>
-              </a:ext>
-            </a:extLst>
-          </p:cNvPr>
-          <p:cNvSpPr txBox="1">
-            <a:spLocks/>
-          </p:cNvSpPr>
-          <p:nvPr>
-            <p:custDataLst>
-              <p:tags r:id="rId1"/>
-            </p:custDataLst>
-          </p:nvPr>
-        </p:nvSpPr>
-        <p:spPr>
-          <a:xfrm>
-            <a:off x="9425" y="1944958"/>
-            <a:ext cx="12191999" cy="868461"/>
-          </a:xfrm>
-          <a:prstGeom prst="rect">
-            <a:avLst/>
-          </a:prstGeom>
-        </p:spPr>
-        <p:txBody>
-          <a:bodyPr/>
-          <a:lstStyle>
-            <a:lvl1pPr marL="0" indent="0" algn="ctr" defTabSz="1460754" rtl="0" eaLnBrk="1" latinLnBrk="0" hangingPunct="1">
-              <a:lnSpc>
-                <a:spcPct val="90000"/>
-              </a:lnSpc>
-              <a:spcBef>
-                <a:spcPts val="1598"/>
-              </a:spcBef>
-              <a:buFont typeface="Arial" panose="020B0604020202020204" pitchFamily="34" charset="0"/>
-              <a:buNone/>
-              <a:defRPr sz="4000" kern="1200">
-                <a:solidFill>
-                  <a:schemeClr val="tx1">
-                    <a:lumMod val="65000"/>
-                    <a:lumOff val="35000"/>
-                  </a:schemeClr>
-                </a:solidFill>
-                <a:latin typeface="+mn-lt"/>
-                <a:ea typeface="+mn-ea"/>
-                <a:cs typeface="+mn-cs"/>
-              </a:defRPr>
-            </a:lvl1pPr>
-            <a:lvl2pPr marL="1095566" indent="-365189" algn="l" defTabSz="1460754" rtl="0" eaLnBrk="1" latinLnBrk="0" hangingPunct="1">
-              <a:lnSpc>
-                <a:spcPct val="90000"/>
-              </a:lnSpc>
-              <a:spcBef>
-                <a:spcPts val="799"/>
-              </a:spcBef>
-              <a:buFont typeface="Arial" panose="020B0604020202020204" pitchFamily="34" charset="0"/>
-              <a:buChar char="•"/>
-              <a:defRPr sz="3834" kern="1200">
-                <a:solidFill>
-                  <a:schemeClr val="tx1"/>
-                </a:solidFill>
-                <a:latin typeface="+mn-lt"/>
-                <a:ea typeface="+mn-ea"/>
-                <a:cs typeface="+mn-cs"/>
-              </a:defRPr>
-            </a:lvl2pPr>
-            <a:lvl3pPr marL="1825943" indent="-365189" algn="l" defTabSz="1460754" rtl="0" eaLnBrk="1" latinLnBrk="0" hangingPunct="1">
-              <a:lnSpc>
-                <a:spcPct val="90000"/>
-              </a:lnSpc>
-              <a:spcBef>
-                <a:spcPts val="799"/>
-              </a:spcBef>
-              <a:buFont typeface="Arial" panose="020B0604020202020204" pitchFamily="34" charset="0"/>
-              <a:buChar char="•"/>
-              <a:defRPr sz="3195" kern="1200">
-                <a:solidFill>
-                  <a:schemeClr val="tx1"/>
-                </a:solidFill>
-                <a:latin typeface="+mn-lt"/>
-                <a:ea typeface="+mn-ea"/>
-                <a:cs typeface="+mn-cs"/>
-              </a:defRPr>
-            </a:lvl3pPr>
-            <a:lvl4pPr marL="2556320" indent="-365189" algn="l" defTabSz="1460754" rtl="0" eaLnBrk="1" latinLnBrk="0" hangingPunct="1">
-              <a:lnSpc>
-                <a:spcPct val="90000"/>
-              </a:lnSpc>
-              <a:spcBef>
-                <a:spcPts val="799"/>
-              </a:spcBef>
-              <a:buFont typeface="Arial" panose="020B0604020202020204" pitchFamily="34" charset="0"/>
-              <a:buChar char="•"/>
-              <a:defRPr sz="2876" kern="1200">
-                <a:solidFill>
-                  <a:schemeClr val="tx1"/>
-                </a:solidFill>
-                <a:latin typeface="+mn-lt"/>
-                <a:ea typeface="+mn-ea"/>
-                <a:cs typeface="+mn-cs"/>
-              </a:defRPr>
-            </a:lvl4pPr>
-            <a:lvl5pPr marL="3286697" indent="-365189" algn="l" defTabSz="1460754" rtl="0" eaLnBrk="1" latinLnBrk="0" hangingPunct="1">
-              <a:lnSpc>
-                <a:spcPct val="90000"/>
-              </a:lnSpc>
-              <a:spcBef>
-                <a:spcPts val="799"/>
-              </a:spcBef>
-              <a:buFont typeface="Arial" panose="020B0604020202020204" pitchFamily="34" charset="0"/>
-              <a:buChar char="•"/>
-              <a:defRPr sz="2876" kern="1200">
-                <a:solidFill>
-                  <a:schemeClr val="tx1"/>
-                </a:solidFill>
-                <a:latin typeface="+mn-lt"/>
-                <a:ea typeface="+mn-ea"/>
-                <a:cs typeface="+mn-cs"/>
-              </a:defRPr>
-            </a:lvl5pPr>
-            <a:lvl6pPr marL="4017074" indent="-365189" algn="l" defTabSz="1460754" rtl="0" eaLnBrk="1" latinLnBrk="0" hangingPunct="1">
-              <a:lnSpc>
-                <a:spcPct val="90000"/>
-              </a:lnSpc>
-              <a:spcBef>
-                <a:spcPts val="799"/>
-              </a:spcBef>
-              <a:buFont typeface="Arial" panose="020B0604020202020204" pitchFamily="34" charset="0"/>
-              <a:buChar char="•"/>
-              <a:defRPr sz="2876" kern="1200">
-                <a:solidFill>
-                  <a:schemeClr val="tx1"/>
-                </a:solidFill>
-                <a:latin typeface="+mn-lt"/>
-                <a:ea typeface="+mn-ea"/>
-                <a:cs typeface="+mn-cs"/>
-              </a:defRPr>
-            </a:lvl6pPr>
-            <a:lvl7pPr marL="4747451" indent="-365189" algn="l" defTabSz="1460754" rtl="0" eaLnBrk="1" latinLnBrk="0" hangingPunct="1">
-              <a:lnSpc>
-                <a:spcPct val="90000"/>
-              </a:lnSpc>
-              <a:spcBef>
-                <a:spcPts val="799"/>
-              </a:spcBef>
-              <a:buFont typeface="Arial" panose="020B0604020202020204" pitchFamily="34" charset="0"/>
-              <a:buChar char="•"/>
-              <a:defRPr sz="2876" kern="1200">
-                <a:solidFill>
-                  <a:schemeClr val="tx1"/>
-                </a:solidFill>
-                <a:latin typeface="+mn-lt"/>
-                <a:ea typeface="+mn-ea"/>
-                <a:cs typeface="+mn-cs"/>
-              </a:defRPr>
-            </a:lvl7pPr>
-            <a:lvl8pPr marL="5477828" indent="-365189" algn="l" defTabSz="1460754" rtl="0" eaLnBrk="1" latinLnBrk="0" hangingPunct="1">
-              <a:lnSpc>
-                <a:spcPct val="90000"/>
-              </a:lnSpc>
-              <a:spcBef>
-                <a:spcPts val="799"/>
-              </a:spcBef>
-              <a:buFont typeface="Arial" panose="020B0604020202020204" pitchFamily="34" charset="0"/>
-              <a:buChar char="•"/>
-              <a:defRPr sz="2876" kern="1200">
-                <a:solidFill>
-                  <a:schemeClr val="tx1"/>
-                </a:solidFill>
-                <a:latin typeface="+mn-lt"/>
-                <a:ea typeface="+mn-ea"/>
-                <a:cs typeface="+mn-cs"/>
-              </a:defRPr>
-            </a:lvl8pPr>
-            <a:lvl9pPr marL="6208205" indent="-365189" algn="l" defTabSz="1460754" rtl="0" eaLnBrk="1" latinLnBrk="0" hangingPunct="1">
-              <a:lnSpc>
-                <a:spcPct val="90000"/>
-              </a:lnSpc>
-              <a:spcBef>
-                <a:spcPts val="799"/>
-              </a:spcBef>
-              <a:buFont typeface="Arial" panose="020B0604020202020204" pitchFamily="34" charset="0"/>
-              <a:buChar char="•"/>
-              <a:defRPr sz="2876" kern="1200">
-                <a:solidFill>
-                  <a:schemeClr val="tx1"/>
-                </a:solidFill>
-                <a:latin typeface="+mn-lt"/>
-                <a:ea typeface="+mn-ea"/>
-                <a:cs typeface="+mn-cs"/>
-              </a:defRPr>
-            </a:lvl9pPr>
-          </a:lstStyle>
-          <a:p>
-            <a:r>
-              <a:rPr lang="en-US" sz="7000" dirty="0" err="1">
-                <a:solidFill>
-                  <a:schemeClr val="bg1"/>
-                </a:solidFill>
-                <a:latin typeface="Nexa Bold" panose="02000000000000000000" pitchFamily="50" charset="0"/>
-              </a:rPr>
-              <a:t>Hướng</a:t>
-            </a:r>
-            <a:r>
-              <a:rPr lang="en-US" sz="7000" dirty="0">
-                <a:solidFill>
-                  <a:schemeClr val="bg1"/>
-                </a:solidFill>
-                <a:latin typeface="Nexa Bold" panose="02000000000000000000" pitchFamily="50" charset="0"/>
-              </a:rPr>
-              <a:t> </a:t>
-            </a:r>
-            <a:r>
-              <a:rPr lang="en-US" sz="7000" dirty="0" err="1">
-                <a:solidFill>
-                  <a:schemeClr val="bg1"/>
-                </a:solidFill>
-                <a:latin typeface="Nexa Bold" panose="02000000000000000000" pitchFamily="50" charset="0"/>
-              </a:rPr>
-              <a:t>phát</a:t>
-            </a:r>
-            <a:r>
-              <a:rPr lang="en-US" sz="7000" dirty="0">
-                <a:solidFill>
-                  <a:schemeClr val="bg1"/>
-                </a:solidFill>
-                <a:latin typeface="Nexa Bold" panose="02000000000000000000" pitchFamily="50" charset="0"/>
-              </a:rPr>
-              <a:t> </a:t>
-            </a:r>
-            <a:r>
-              <a:rPr lang="en-US" sz="7000" dirty="0" err="1">
-                <a:solidFill>
-                  <a:schemeClr val="bg1"/>
-                </a:solidFill>
-                <a:latin typeface="Nexa Bold" panose="02000000000000000000" pitchFamily="50" charset="0"/>
-              </a:rPr>
-              <a:t>triển</a:t>
-            </a:r>
-            <a:endParaRPr lang="id-ID" sz="7000" dirty="0">
-              <a:solidFill>
-                <a:schemeClr val="bg1"/>
-              </a:solidFill>
-              <a:latin typeface="Nexa Bold" panose="02000000000000000000" pitchFamily="50" charset="0"/>
-            </a:endParaRPr>
-          </a:p>
-        </p:txBody>
-      </p:sp>
-    </p:spTree>
-    <p:extLst>
-      <p:ext uri="{BB962C8B-B14F-4D97-AF65-F5344CB8AC3E}">
-        <p14:creationId xmlns:p14="http://schemas.microsoft.com/office/powerpoint/2010/main" val="1347688744"/>
-      </p:ext>
-    </p:extLst>
-  </p:cSld>
-  <p:clrMapOvr>
-    <a:masterClrMapping/>
-  </p:clrMapOvr>
-  <mc:AlternateContent xmlns:mc="http://schemas.openxmlformats.org/markup-compatibility/2006" xmlns:p14="http://schemas.microsoft.com/office/powerpoint/2010/main">
-    <mc:Choice Requires="p14">
-      <p:transition spd="slow">
-        <p14:flash/>
-      </p:transition>
-    </mc:Choice>
-    <mc:Fallback xmlns="">
-      <p:transition spd="slow">
         <p:fade/>
       </p:transition>
     </mc:Fallback>
@@ -26800,6 +26703,580 @@
       </p:grpSpPr>
       <p:sp>
         <p:nvSpPr>
+          <p:cNvPr id="2" name="Rectangle 2">
+            <a:extLst>
+              <a:ext uri="{FF2B5EF4-FFF2-40B4-BE49-F238E27FC236}">
+                <a16:creationId xmlns:a16="http://schemas.microsoft.com/office/drawing/2014/main" id="{221AC957-E7F8-4915-BB68-E3D8D4295682}"/>
+              </a:ext>
+            </a:extLst>
+          </p:cNvPr>
+          <p:cNvSpPr/>
+          <p:nvPr/>
+        </p:nvSpPr>
+        <p:spPr>
+          <a:xfrm flipV="1">
+            <a:off x="9426" y="15447"/>
+            <a:ext cx="12173149" cy="5407874"/>
+          </a:xfrm>
+          <a:custGeom>
+            <a:avLst/>
+            <a:gdLst>
+              <a:gd name="connsiteX0" fmla="*/ 0 w 19477038"/>
+              <a:gd name="connsiteY0" fmla="*/ 0 h 8229600"/>
+              <a:gd name="connsiteX1" fmla="*/ 19477038 w 19477038"/>
+              <a:gd name="connsiteY1" fmla="*/ 0 h 8229600"/>
+              <a:gd name="connsiteX2" fmla="*/ 19477038 w 19477038"/>
+              <a:gd name="connsiteY2" fmla="*/ 8229600 h 8229600"/>
+              <a:gd name="connsiteX3" fmla="*/ 0 w 19477038"/>
+              <a:gd name="connsiteY3" fmla="*/ 8229600 h 8229600"/>
+              <a:gd name="connsiteX4" fmla="*/ 0 w 19477038"/>
+              <a:gd name="connsiteY4" fmla="*/ 0 h 8229600"/>
+              <a:gd name="connsiteX0" fmla="*/ 0 w 19477038"/>
+              <a:gd name="connsiteY0" fmla="*/ 550606 h 8780206"/>
+              <a:gd name="connsiteX1" fmla="*/ 19477038 w 19477038"/>
+              <a:gd name="connsiteY1" fmla="*/ 550606 h 8780206"/>
+              <a:gd name="connsiteX2" fmla="*/ 19477038 w 19477038"/>
+              <a:gd name="connsiteY2" fmla="*/ 8780206 h 8780206"/>
+              <a:gd name="connsiteX3" fmla="*/ 0 w 19477038"/>
+              <a:gd name="connsiteY3" fmla="*/ 8780206 h 8780206"/>
+              <a:gd name="connsiteX4" fmla="*/ 0 w 19477038"/>
+              <a:gd name="connsiteY4" fmla="*/ 550606 h 8780206"/>
+              <a:gd name="connsiteX0" fmla="*/ 0 w 19477038"/>
+              <a:gd name="connsiteY0" fmla="*/ 284740 h 8514340"/>
+              <a:gd name="connsiteX1" fmla="*/ 19477038 w 19477038"/>
+              <a:gd name="connsiteY1" fmla="*/ 284740 h 8514340"/>
+              <a:gd name="connsiteX2" fmla="*/ 19477038 w 19477038"/>
+              <a:gd name="connsiteY2" fmla="*/ 8514340 h 8514340"/>
+              <a:gd name="connsiteX3" fmla="*/ 0 w 19477038"/>
+              <a:gd name="connsiteY3" fmla="*/ 8514340 h 8514340"/>
+              <a:gd name="connsiteX4" fmla="*/ 0 w 19477038"/>
+              <a:gd name="connsiteY4" fmla="*/ 284740 h 8514340"/>
+              <a:gd name="connsiteX0" fmla="*/ 0 w 19477038"/>
+              <a:gd name="connsiteY0" fmla="*/ 422999 h 8652599"/>
+              <a:gd name="connsiteX1" fmla="*/ 19477038 w 19477038"/>
+              <a:gd name="connsiteY1" fmla="*/ 422999 h 8652599"/>
+              <a:gd name="connsiteX2" fmla="*/ 19477038 w 19477038"/>
+              <a:gd name="connsiteY2" fmla="*/ 8652599 h 8652599"/>
+              <a:gd name="connsiteX3" fmla="*/ 0 w 19477038"/>
+              <a:gd name="connsiteY3" fmla="*/ 8652599 h 8652599"/>
+              <a:gd name="connsiteX4" fmla="*/ 0 w 19477038"/>
+              <a:gd name="connsiteY4" fmla="*/ 422999 h 8652599"/>
+            </a:gdLst>
+            <a:ahLst/>
+            <a:cxnLst>
+              <a:cxn ang="0">
+                <a:pos x="connsiteX0" y="connsiteY0"/>
+              </a:cxn>
+              <a:cxn ang="0">
+                <a:pos x="connsiteX1" y="connsiteY1"/>
+              </a:cxn>
+              <a:cxn ang="0">
+                <a:pos x="connsiteX2" y="connsiteY2"/>
+              </a:cxn>
+              <a:cxn ang="0">
+                <a:pos x="connsiteX3" y="connsiteY3"/>
+              </a:cxn>
+              <a:cxn ang="0">
+                <a:pos x="connsiteX4" y="connsiteY4"/>
+              </a:cxn>
+            </a:cxnLst>
+            <a:rect l="l" t="t" r="r" b="b"/>
+            <a:pathLst>
+              <a:path w="19477038" h="8652599">
+                <a:moveTo>
+                  <a:pt x="0" y="422999"/>
+                </a:moveTo>
+                <a:cubicBezTo>
+                  <a:pt x="7406746" y="-1199323"/>
+                  <a:pt x="12276770" y="2517270"/>
+                  <a:pt x="19477038" y="422999"/>
+                </a:cubicBezTo>
+                <a:lnTo>
+                  <a:pt x="19477038" y="8652599"/>
+                </a:lnTo>
+                <a:lnTo>
+                  <a:pt x="0" y="8652599"/>
+                </a:lnTo>
+                <a:lnTo>
+                  <a:pt x="0" y="422999"/>
+                </a:lnTo>
+                <a:close/>
+              </a:path>
+            </a:pathLst>
+          </a:custGeom>
+          <a:solidFill>
+            <a:schemeClr val="accent1">
+              <a:alpha val="48000"/>
+            </a:schemeClr>
+          </a:solidFill>
+          <a:ln>
+            <a:noFill/>
+          </a:ln>
+        </p:spPr>
+        <p:style>
+          <a:lnRef idx="2">
+            <a:schemeClr val="accent1">
+              <a:shade val="50000"/>
+            </a:schemeClr>
+          </a:lnRef>
+          <a:fillRef idx="1">
+            <a:schemeClr val="accent1"/>
+          </a:fillRef>
+          <a:effectRef idx="0">
+            <a:schemeClr val="accent1"/>
+          </a:effectRef>
+          <a:fontRef idx="minor">
+            <a:schemeClr val="lt1"/>
+          </a:fontRef>
+        </p:style>
+        <p:txBody>
+          <a:bodyPr rtlCol="0" anchor="ctr"/>
+          <a:lstStyle/>
+          <a:p>
+            <a:pPr algn="ctr"/>
+            <a:endParaRPr lang="id-ID" sz="1125"/>
+          </a:p>
+        </p:txBody>
+      </p:sp>
+      <p:sp>
+        <p:nvSpPr>
+          <p:cNvPr id="3" name="Rectangle 2">
+            <a:extLst>
+              <a:ext uri="{FF2B5EF4-FFF2-40B4-BE49-F238E27FC236}">
+                <a16:creationId xmlns:a16="http://schemas.microsoft.com/office/drawing/2014/main" id="{5A08CAD9-15C6-4D2F-95C4-9D8E26663692}"/>
+              </a:ext>
+            </a:extLst>
+          </p:cNvPr>
+          <p:cNvSpPr/>
+          <p:nvPr/>
+        </p:nvSpPr>
+        <p:spPr>
+          <a:xfrm flipH="1" flipV="1">
+            <a:off x="9426" y="0"/>
+            <a:ext cx="12173149" cy="5419781"/>
+          </a:xfrm>
+          <a:custGeom>
+            <a:avLst/>
+            <a:gdLst>
+              <a:gd name="connsiteX0" fmla="*/ 0 w 19477038"/>
+              <a:gd name="connsiteY0" fmla="*/ 0 h 8229600"/>
+              <a:gd name="connsiteX1" fmla="*/ 19477038 w 19477038"/>
+              <a:gd name="connsiteY1" fmla="*/ 0 h 8229600"/>
+              <a:gd name="connsiteX2" fmla="*/ 19477038 w 19477038"/>
+              <a:gd name="connsiteY2" fmla="*/ 8229600 h 8229600"/>
+              <a:gd name="connsiteX3" fmla="*/ 0 w 19477038"/>
+              <a:gd name="connsiteY3" fmla="*/ 8229600 h 8229600"/>
+              <a:gd name="connsiteX4" fmla="*/ 0 w 19477038"/>
+              <a:gd name="connsiteY4" fmla="*/ 0 h 8229600"/>
+              <a:gd name="connsiteX0" fmla="*/ 0 w 19477038"/>
+              <a:gd name="connsiteY0" fmla="*/ 550606 h 8780206"/>
+              <a:gd name="connsiteX1" fmla="*/ 19477038 w 19477038"/>
+              <a:gd name="connsiteY1" fmla="*/ 550606 h 8780206"/>
+              <a:gd name="connsiteX2" fmla="*/ 19477038 w 19477038"/>
+              <a:gd name="connsiteY2" fmla="*/ 8780206 h 8780206"/>
+              <a:gd name="connsiteX3" fmla="*/ 0 w 19477038"/>
+              <a:gd name="connsiteY3" fmla="*/ 8780206 h 8780206"/>
+              <a:gd name="connsiteX4" fmla="*/ 0 w 19477038"/>
+              <a:gd name="connsiteY4" fmla="*/ 550606 h 8780206"/>
+              <a:gd name="connsiteX0" fmla="*/ 0 w 19477038"/>
+              <a:gd name="connsiteY0" fmla="*/ 284740 h 8514340"/>
+              <a:gd name="connsiteX1" fmla="*/ 19477038 w 19477038"/>
+              <a:gd name="connsiteY1" fmla="*/ 284740 h 8514340"/>
+              <a:gd name="connsiteX2" fmla="*/ 19477038 w 19477038"/>
+              <a:gd name="connsiteY2" fmla="*/ 8514340 h 8514340"/>
+              <a:gd name="connsiteX3" fmla="*/ 0 w 19477038"/>
+              <a:gd name="connsiteY3" fmla="*/ 8514340 h 8514340"/>
+              <a:gd name="connsiteX4" fmla="*/ 0 w 19477038"/>
+              <a:gd name="connsiteY4" fmla="*/ 284740 h 8514340"/>
+              <a:gd name="connsiteX0" fmla="*/ 0 w 19477038"/>
+              <a:gd name="connsiteY0" fmla="*/ 422999 h 8652599"/>
+              <a:gd name="connsiteX1" fmla="*/ 19477038 w 19477038"/>
+              <a:gd name="connsiteY1" fmla="*/ 422999 h 8652599"/>
+              <a:gd name="connsiteX2" fmla="*/ 19477038 w 19477038"/>
+              <a:gd name="connsiteY2" fmla="*/ 8652599 h 8652599"/>
+              <a:gd name="connsiteX3" fmla="*/ 0 w 19477038"/>
+              <a:gd name="connsiteY3" fmla="*/ 8652599 h 8652599"/>
+              <a:gd name="connsiteX4" fmla="*/ 0 w 19477038"/>
+              <a:gd name="connsiteY4" fmla="*/ 422999 h 8652599"/>
+            </a:gdLst>
+            <a:ahLst/>
+            <a:cxnLst>
+              <a:cxn ang="0">
+                <a:pos x="connsiteX0" y="connsiteY0"/>
+              </a:cxn>
+              <a:cxn ang="0">
+                <a:pos x="connsiteX1" y="connsiteY1"/>
+              </a:cxn>
+              <a:cxn ang="0">
+                <a:pos x="connsiteX2" y="connsiteY2"/>
+              </a:cxn>
+              <a:cxn ang="0">
+                <a:pos x="connsiteX3" y="connsiteY3"/>
+              </a:cxn>
+              <a:cxn ang="0">
+                <a:pos x="connsiteX4" y="connsiteY4"/>
+              </a:cxn>
+            </a:cxnLst>
+            <a:rect l="l" t="t" r="r" b="b"/>
+            <a:pathLst>
+              <a:path w="19477038" h="8652599">
+                <a:moveTo>
+                  <a:pt x="0" y="422999"/>
+                </a:moveTo>
+                <a:cubicBezTo>
+                  <a:pt x="7406746" y="-1199323"/>
+                  <a:pt x="12276770" y="2517270"/>
+                  <a:pt x="19477038" y="422999"/>
+                </a:cubicBezTo>
+                <a:lnTo>
+                  <a:pt x="19477038" y="8652599"/>
+                </a:lnTo>
+                <a:lnTo>
+                  <a:pt x="0" y="8652599"/>
+                </a:lnTo>
+                <a:lnTo>
+                  <a:pt x="0" y="422999"/>
+                </a:lnTo>
+                <a:close/>
+              </a:path>
+            </a:pathLst>
+          </a:custGeom>
+          <a:gradFill flip="none" rotWithShape="1">
+            <a:gsLst>
+              <a:gs pos="1000">
+                <a:schemeClr val="accent1"/>
+              </a:gs>
+              <a:gs pos="100000">
+                <a:schemeClr val="accent5"/>
+              </a:gs>
+            </a:gsLst>
+            <a:lin ang="2700000" scaled="1"/>
+            <a:tileRect/>
+          </a:gradFill>
+          <a:ln>
+            <a:noFill/>
+          </a:ln>
+        </p:spPr>
+        <p:style>
+          <a:lnRef idx="2">
+            <a:schemeClr val="accent1">
+              <a:shade val="50000"/>
+            </a:schemeClr>
+          </a:lnRef>
+          <a:fillRef idx="1">
+            <a:schemeClr val="accent1"/>
+          </a:fillRef>
+          <a:effectRef idx="0">
+            <a:schemeClr val="accent1"/>
+          </a:effectRef>
+          <a:fontRef idx="minor">
+            <a:schemeClr val="lt1"/>
+          </a:fontRef>
+        </p:style>
+        <p:txBody>
+          <a:bodyPr rtlCol="0" anchor="ctr"/>
+          <a:lstStyle/>
+          <a:p>
+            <a:pPr algn="ctr"/>
+            <a:endParaRPr lang="id-ID" sz="1125"/>
+          </a:p>
+        </p:txBody>
+      </p:sp>
+      <p:sp>
+        <p:nvSpPr>
+          <p:cNvPr id="8" name="Text">
+            <a:extLst>
+              <a:ext uri="{FF2B5EF4-FFF2-40B4-BE49-F238E27FC236}">
+                <a16:creationId xmlns:a16="http://schemas.microsoft.com/office/drawing/2014/main" id="{0EE4339D-A1D2-4FF3-AEF6-875A808CC359}"/>
+              </a:ext>
+            </a:extLst>
+          </p:cNvPr>
+          <p:cNvSpPr txBox="1">
+            <a:spLocks/>
+          </p:cNvSpPr>
+          <p:nvPr>
+            <p:custDataLst>
+              <p:tags r:id="rId1"/>
+            </p:custDataLst>
+          </p:nvPr>
+        </p:nvSpPr>
+        <p:spPr>
+          <a:xfrm>
+            <a:off x="9425" y="1944958"/>
+            <a:ext cx="12191999" cy="868461"/>
+          </a:xfrm>
+          <a:prstGeom prst="rect">
+            <a:avLst/>
+          </a:prstGeom>
+        </p:spPr>
+        <p:txBody>
+          <a:bodyPr/>
+          <a:lstStyle>
+            <a:lvl1pPr marL="0" indent="0" algn="ctr" defTabSz="1460754" rtl="0" eaLnBrk="1" latinLnBrk="0" hangingPunct="1">
+              <a:lnSpc>
+                <a:spcPct val="90000"/>
+              </a:lnSpc>
+              <a:spcBef>
+                <a:spcPts val="1598"/>
+              </a:spcBef>
+              <a:buFont typeface="Arial" panose="020B0604020202020204" pitchFamily="34" charset="0"/>
+              <a:buNone/>
+              <a:defRPr sz="4000" kern="1200">
+                <a:solidFill>
+                  <a:schemeClr val="tx1">
+                    <a:lumMod val="65000"/>
+                    <a:lumOff val="35000"/>
+                  </a:schemeClr>
+                </a:solidFill>
+                <a:latin typeface="+mn-lt"/>
+                <a:ea typeface="+mn-ea"/>
+                <a:cs typeface="+mn-cs"/>
+              </a:defRPr>
+            </a:lvl1pPr>
+            <a:lvl2pPr marL="1095566" indent="-365189" algn="l" defTabSz="1460754" rtl="0" eaLnBrk="1" latinLnBrk="0" hangingPunct="1">
+              <a:lnSpc>
+                <a:spcPct val="90000"/>
+              </a:lnSpc>
+              <a:spcBef>
+                <a:spcPts val="799"/>
+              </a:spcBef>
+              <a:buFont typeface="Arial" panose="020B0604020202020204" pitchFamily="34" charset="0"/>
+              <a:buChar char="•"/>
+              <a:defRPr sz="3834" kern="1200">
+                <a:solidFill>
+                  <a:schemeClr val="tx1"/>
+                </a:solidFill>
+                <a:latin typeface="+mn-lt"/>
+                <a:ea typeface="+mn-ea"/>
+                <a:cs typeface="+mn-cs"/>
+              </a:defRPr>
+            </a:lvl2pPr>
+            <a:lvl3pPr marL="1825943" indent="-365189" algn="l" defTabSz="1460754" rtl="0" eaLnBrk="1" latinLnBrk="0" hangingPunct="1">
+              <a:lnSpc>
+                <a:spcPct val="90000"/>
+              </a:lnSpc>
+              <a:spcBef>
+                <a:spcPts val="799"/>
+              </a:spcBef>
+              <a:buFont typeface="Arial" panose="020B0604020202020204" pitchFamily="34" charset="0"/>
+              <a:buChar char="•"/>
+              <a:defRPr sz="3195" kern="1200">
+                <a:solidFill>
+                  <a:schemeClr val="tx1"/>
+                </a:solidFill>
+                <a:latin typeface="+mn-lt"/>
+                <a:ea typeface="+mn-ea"/>
+                <a:cs typeface="+mn-cs"/>
+              </a:defRPr>
+            </a:lvl3pPr>
+            <a:lvl4pPr marL="2556320" indent="-365189" algn="l" defTabSz="1460754" rtl="0" eaLnBrk="1" latinLnBrk="0" hangingPunct="1">
+              <a:lnSpc>
+                <a:spcPct val="90000"/>
+              </a:lnSpc>
+              <a:spcBef>
+                <a:spcPts val="799"/>
+              </a:spcBef>
+              <a:buFont typeface="Arial" panose="020B0604020202020204" pitchFamily="34" charset="0"/>
+              <a:buChar char="•"/>
+              <a:defRPr sz="2876" kern="1200">
+                <a:solidFill>
+                  <a:schemeClr val="tx1"/>
+                </a:solidFill>
+                <a:latin typeface="+mn-lt"/>
+                <a:ea typeface="+mn-ea"/>
+                <a:cs typeface="+mn-cs"/>
+              </a:defRPr>
+            </a:lvl4pPr>
+            <a:lvl5pPr marL="3286697" indent="-365189" algn="l" defTabSz="1460754" rtl="0" eaLnBrk="1" latinLnBrk="0" hangingPunct="1">
+              <a:lnSpc>
+                <a:spcPct val="90000"/>
+              </a:lnSpc>
+              <a:spcBef>
+                <a:spcPts val="799"/>
+              </a:spcBef>
+              <a:buFont typeface="Arial" panose="020B0604020202020204" pitchFamily="34" charset="0"/>
+              <a:buChar char="•"/>
+              <a:defRPr sz="2876" kern="1200">
+                <a:solidFill>
+                  <a:schemeClr val="tx1"/>
+                </a:solidFill>
+                <a:latin typeface="+mn-lt"/>
+                <a:ea typeface="+mn-ea"/>
+                <a:cs typeface="+mn-cs"/>
+              </a:defRPr>
+            </a:lvl5pPr>
+            <a:lvl6pPr marL="4017074" indent="-365189" algn="l" defTabSz="1460754" rtl="0" eaLnBrk="1" latinLnBrk="0" hangingPunct="1">
+              <a:lnSpc>
+                <a:spcPct val="90000"/>
+              </a:lnSpc>
+              <a:spcBef>
+                <a:spcPts val="799"/>
+              </a:spcBef>
+              <a:buFont typeface="Arial" panose="020B0604020202020204" pitchFamily="34" charset="0"/>
+              <a:buChar char="•"/>
+              <a:defRPr sz="2876" kern="1200">
+                <a:solidFill>
+                  <a:schemeClr val="tx1"/>
+                </a:solidFill>
+                <a:latin typeface="+mn-lt"/>
+                <a:ea typeface="+mn-ea"/>
+                <a:cs typeface="+mn-cs"/>
+              </a:defRPr>
+            </a:lvl6pPr>
+            <a:lvl7pPr marL="4747451" indent="-365189" algn="l" defTabSz="1460754" rtl="0" eaLnBrk="1" latinLnBrk="0" hangingPunct="1">
+              <a:lnSpc>
+                <a:spcPct val="90000"/>
+              </a:lnSpc>
+              <a:spcBef>
+                <a:spcPts val="799"/>
+              </a:spcBef>
+              <a:buFont typeface="Arial" panose="020B0604020202020204" pitchFamily="34" charset="0"/>
+              <a:buChar char="•"/>
+              <a:defRPr sz="2876" kern="1200">
+                <a:solidFill>
+                  <a:schemeClr val="tx1"/>
+                </a:solidFill>
+                <a:latin typeface="+mn-lt"/>
+                <a:ea typeface="+mn-ea"/>
+                <a:cs typeface="+mn-cs"/>
+              </a:defRPr>
+            </a:lvl7pPr>
+            <a:lvl8pPr marL="5477828" indent="-365189" algn="l" defTabSz="1460754" rtl="0" eaLnBrk="1" latinLnBrk="0" hangingPunct="1">
+              <a:lnSpc>
+                <a:spcPct val="90000"/>
+              </a:lnSpc>
+              <a:spcBef>
+                <a:spcPts val="799"/>
+              </a:spcBef>
+              <a:buFont typeface="Arial" panose="020B0604020202020204" pitchFamily="34" charset="0"/>
+              <a:buChar char="•"/>
+              <a:defRPr sz="2876" kern="1200">
+                <a:solidFill>
+                  <a:schemeClr val="tx1"/>
+                </a:solidFill>
+                <a:latin typeface="+mn-lt"/>
+                <a:ea typeface="+mn-ea"/>
+                <a:cs typeface="+mn-cs"/>
+              </a:defRPr>
+            </a:lvl8pPr>
+            <a:lvl9pPr marL="6208205" indent="-365189" algn="l" defTabSz="1460754" rtl="0" eaLnBrk="1" latinLnBrk="0" hangingPunct="1">
+              <a:lnSpc>
+                <a:spcPct val="90000"/>
+              </a:lnSpc>
+              <a:spcBef>
+                <a:spcPts val="799"/>
+              </a:spcBef>
+              <a:buFont typeface="Arial" panose="020B0604020202020204" pitchFamily="34" charset="0"/>
+              <a:buChar char="•"/>
+              <a:defRPr sz="2876" kern="1200">
+                <a:solidFill>
+                  <a:schemeClr val="tx1"/>
+                </a:solidFill>
+                <a:latin typeface="+mn-lt"/>
+                <a:ea typeface="+mn-ea"/>
+                <a:cs typeface="+mn-cs"/>
+              </a:defRPr>
+            </a:lvl9pPr>
+          </a:lstStyle>
+          <a:p>
+            <a:r>
+              <a:rPr lang="en-US" sz="7000" dirty="0" err="1">
+                <a:solidFill>
+                  <a:schemeClr val="bg1"/>
+                </a:solidFill>
+                <a:latin typeface="Nexa Bold" panose="02000000000000000000" pitchFamily="50" charset="0"/>
+              </a:rPr>
+              <a:t>Hướng</a:t>
+            </a:r>
+            <a:r>
+              <a:rPr lang="en-US" sz="7000" dirty="0">
+                <a:solidFill>
+                  <a:schemeClr val="bg1"/>
+                </a:solidFill>
+                <a:latin typeface="Nexa Bold" panose="02000000000000000000" pitchFamily="50" charset="0"/>
+              </a:rPr>
+              <a:t> </a:t>
+            </a:r>
+            <a:r>
+              <a:rPr lang="en-US" sz="7000" dirty="0" err="1">
+                <a:solidFill>
+                  <a:schemeClr val="bg1"/>
+                </a:solidFill>
+                <a:latin typeface="Nexa Bold" panose="02000000000000000000" pitchFamily="50" charset="0"/>
+              </a:rPr>
+              <a:t>phát</a:t>
+            </a:r>
+            <a:r>
+              <a:rPr lang="en-US" sz="7000" dirty="0">
+                <a:solidFill>
+                  <a:schemeClr val="bg1"/>
+                </a:solidFill>
+                <a:latin typeface="Nexa Bold" panose="02000000000000000000" pitchFamily="50" charset="0"/>
+              </a:rPr>
+              <a:t> </a:t>
+            </a:r>
+            <a:r>
+              <a:rPr lang="en-US" sz="7000" dirty="0" err="1">
+                <a:solidFill>
+                  <a:schemeClr val="bg1"/>
+                </a:solidFill>
+                <a:latin typeface="Nexa Bold" panose="02000000000000000000" pitchFamily="50" charset="0"/>
+              </a:rPr>
+              <a:t>triển</a:t>
+            </a:r>
+            <a:endParaRPr lang="id-ID" sz="7000" dirty="0">
+              <a:solidFill>
+                <a:schemeClr val="bg1"/>
+              </a:solidFill>
+              <a:latin typeface="Nexa Bold" panose="02000000000000000000" pitchFamily="50" charset="0"/>
+            </a:endParaRPr>
+          </a:p>
+        </p:txBody>
+      </p:sp>
+    </p:spTree>
+    <p:extLst>
+      <p:ext uri="{BB962C8B-B14F-4D97-AF65-F5344CB8AC3E}">
+        <p14:creationId xmlns:p14="http://schemas.microsoft.com/office/powerpoint/2010/main" val="1347688744"/>
+      </p:ext>
+    </p:extLst>
+  </p:cSld>
+  <p:clrMapOvr>
+    <a:masterClrMapping/>
+  </p:clrMapOvr>
+  <mc:AlternateContent xmlns:mc="http://schemas.openxmlformats.org/markup-compatibility/2006" xmlns:p14="http://schemas.microsoft.com/office/powerpoint/2010/main">
+    <mc:Choice Requires="p14">
+      <p:transition spd="slow">
+        <p14:flash/>
+      </p:transition>
+    </mc:Choice>
+    <mc:Fallback xmlns="">
+      <p:transition spd="slow">
+        <p:fade/>
+      </p:transition>
+    </mc:Fallback>
+  </mc:AlternateContent>
+</p:sld>
+</file>
+
+<file path=ppt/slides/slide31.xml><?xml version="1.0" encoding="utf-8"?>
+<p:sld xmlns:a="http://schemas.openxmlformats.org/drawingml/2006/main" xmlns:r="http://schemas.openxmlformats.org/officeDocument/2006/relationships" xmlns:p="http://schemas.openxmlformats.org/presentationml/2006/main">
+  <p:cSld>
+    <p:spTree>
+      <p:nvGrpSpPr>
+        <p:cNvPr id="1" name=""/>
+        <p:cNvGrpSpPr/>
+        <p:nvPr/>
+      </p:nvGrpSpPr>
+      <p:grpSpPr>
+        <a:xfrm>
+          <a:off x="0" y="0"/>
+          <a:ext cx="0" cy="0"/>
+          <a:chOff x="0" y="0"/>
+          <a:chExt cx="0" cy="0"/>
+        </a:xfrm>
+      </p:grpSpPr>
+      <p:sp>
+        <p:nvSpPr>
           <p:cNvPr id="45" name="TextBox 44">
             <a:extLst>
               <a:ext uri="{FF2B5EF4-FFF2-40B4-BE49-F238E27FC236}">
@@ -27732,7 +28209,7 @@
 </p:sld>
 </file>
 
-<file path=ppt/slides/slide31.xml><?xml version="1.0" encoding="utf-8"?>
+<file path=ppt/slides/slide32.xml><?xml version="1.0" encoding="utf-8"?>
 <p:sld xmlns:a="http://schemas.openxmlformats.org/drawingml/2006/main" xmlns:r="http://schemas.openxmlformats.org/officeDocument/2006/relationships" xmlns:p="http://schemas.openxmlformats.org/presentationml/2006/main">
   <p:cSld>
     <p:spTree>
@@ -28270,7 +28747,7 @@
 </p:sld>
 </file>
 
-<file path=ppt/slides/slide32.xml><?xml version="1.0" encoding="utf-8"?>
+<file path=ppt/slides/slide33.xml><?xml version="1.0" encoding="utf-8"?>
 <p:sld xmlns:a="http://schemas.openxmlformats.org/drawingml/2006/main" xmlns:r="http://schemas.openxmlformats.org/officeDocument/2006/relationships" xmlns:p="http://schemas.openxmlformats.org/presentationml/2006/main">
   <p:cSld>
     <p:bg>

</xml_diff>